<commit_message>
Update Lost And found website.pptx
</commit_message>
<xml_diff>
--- a/Lost And found website.pptx
+++ b/Lost And found website.pptx
@@ -120,6 +120,366 @@
 </p:presentation>
 </file>
 
+<file path=ppt/changesInfos/changesInfo1.xml><?xml version="1.0" encoding="utf-8"?>
+<pc:chgInfo xmlns:a="http://schemas.openxmlformats.org/drawingml/2006/main" xmlns:r="http://schemas.openxmlformats.org/officeDocument/2006/relationships" xmlns:ac="http://schemas.microsoft.com/office/drawing/2013/main/command" xmlns:pc="http://schemas.microsoft.com/office/powerpoint/2013/main/command">
+  <pc:docChgLst>
+    <pc:chgData name="Naman" userId="583bf7a4a802f89e" providerId="LiveId" clId="{D06AEFC2-249C-44B6-9FF9-821C13C26D7C}"/>
+    <pc:docChg chg="undo custSel addSld delSld modSld addSection delSection">
+      <pc:chgData name="Naman" userId="583bf7a4a802f89e" providerId="LiveId" clId="{D06AEFC2-249C-44B6-9FF9-821C13C26D7C}" dt="2022-10-15T15:16:32.385" v="326" actId="700"/>
+      <pc:docMkLst>
+        <pc:docMk/>
+      </pc:docMkLst>
+      <pc:sldChg chg="modSp mod">
+        <pc:chgData name="Naman" userId="583bf7a4a802f89e" providerId="LiveId" clId="{D06AEFC2-249C-44B6-9FF9-821C13C26D7C}" dt="2022-10-15T15:13:11.359" v="208" actId="113"/>
+        <pc:sldMkLst>
+          <pc:docMk/>
+          <pc:sldMk cId="2849662547" sldId="313"/>
+        </pc:sldMkLst>
+        <pc:spChg chg="mod">
+          <ac:chgData name="Naman" userId="583bf7a4a802f89e" providerId="LiveId" clId="{D06AEFC2-249C-44B6-9FF9-821C13C26D7C}" dt="2022-10-15T15:13:11.359" v="208" actId="113"/>
+          <ac:spMkLst>
+            <pc:docMk/>
+            <pc:sldMk cId="2849662547" sldId="313"/>
+            <ac:spMk id="2" creationId="{EF3699CD-0F64-02D7-3803-732ADDA3A2B4}"/>
+          </ac:spMkLst>
+        </pc:spChg>
+        <pc:spChg chg="mod">
+          <ac:chgData name="Naman" userId="583bf7a4a802f89e" providerId="LiveId" clId="{D06AEFC2-249C-44B6-9FF9-821C13C26D7C}" dt="2022-10-15T15:12:00.917" v="199" actId="255"/>
+          <ac:spMkLst>
+            <pc:docMk/>
+            <pc:sldMk cId="2849662547" sldId="313"/>
+            <ac:spMk id="3" creationId="{5860AE4F-238B-AB85-7A25-044054ECD556}"/>
+          </ac:spMkLst>
+        </pc:spChg>
+      </pc:sldChg>
+      <pc:sldChg chg="modSp mod">
+        <pc:chgData name="Naman" userId="583bf7a4a802f89e" providerId="LiveId" clId="{D06AEFC2-249C-44B6-9FF9-821C13C26D7C}" dt="2022-10-15T15:13:05.103" v="207" actId="113"/>
+        <pc:sldMkLst>
+          <pc:docMk/>
+          <pc:sldMk cId="583664758" sldId="314"/>
+        </pc:sldMkLst>
+        <pc:spChg chg="mod">
+          <ac:chgData name="Naman" userId="583bf7a4a802f89e" providerId="LiveId" clId="{D06AEFC2-249C-44B6-9FF9-821C13C26D7C}" dt="2022-10-15T15:13:05.103" v="207" actId="113"/>
+          <ac:spMkLst>
+            <pc:docMk/>
+            <pc:sldMk cId="583664758" sldId="314"/>
+            <ac:spMk id="2" creationId="{1AFCA965-CEFB-B535-15E6-81B108B29C55}"/>
+          </ac:spMkLst>
+        </pc:spChg>
+        <pc:spChg chg="mod">
+          <ac:chgData name="Naman" userId="583bf7a4a802f89e" providerId="LiveId" clId="{D06AEFC2-249C-44B6-9FF9-821C13C26D7C}" dt="2022-10-15T15:12:13.490" v="200" actId="255"/>
+          <ac:spMkLst>
+            <pc:docMk/>
+            <pc:sldMk cId="583664758" sldId="314"/>
+            <ac:spMk id="3" creationId="{BFFDB282-4F86-B002-4A3C-D5FFBEF81C2B}"/>
+          </ac:spMkLst>
+        </pc:spChg>
+      </pc:sldChg>
+      <pc:sldChg chg="addSp delSp modSp mod modClrScheme chgLayout">
+        <pc:chgData name="Naman" userId="583bf7a4a802f89e" providerId="LiveId" clId="{D06AEFC2-249C-44B6-9FF9-821C13C26D7C}" dt="2022-10-15T15:16:20.210" v="325" actId="20577"/>
+        <pc:sldMkLst>
+          <pc:docMk/>
+          <pc:sldMk cId="2968666269" sldId="315"/>
+        </pc:sldMkLst>
+        <pc:spChg chg="mod ord">
+          <ac:chgData name="Naman" userId="583bf7a4a802f89e" providerId="LiveId" clId="{D06AEFC2-249C-44B6-9FF9-821C13C26D7C}" dt="2022-10-15T15:12:54.793" v="206" actId="2711"/>
+          <ac:spMkLst>
+            <pc:docMk/>
+            <pc:sldMk cId="2968666269" sldId="315"/>
+            <ac:spMk id="2" creationId="{71A21BA4-75E0-BB1E-D409-4E3067BF979E}"/>
+          </ac:spMkLst>
+        </pc:spChg>
+        <pc:spChg chg="del mod ord">
+          <ac:chgData name="Naman" userId="583bf7a4a802f89e" providerId="LiveId" clId="{D06AEFC2-249C-44B6-9FF9-821C13C26D7C}" dt="2022-10-15T14:59:46.523" v="0" actId="700"/>
+          <ac:spMkLst>
+            <pc:docMk/>
+            <pc:sldMk cId="2968666269" sldId="315"/>
+            <ac:spMk id="3" creationId="{FD65181C-BE51-0FAB-DA0E-2341F643C9E7}"/>
+          </ac:spMkLst>
+        </pc:spChg>
+        <pc:spChg chg="add mod ord">
+          <ac:chgData name="Naman" userId="583bf7a4a802f89e" providerId="LiveId" clId="{D06AEFC2-249C-44B6-9FF9-821C13C26D7C}" dt="2022-10-15T15:15:58.945" v="272" actId="20577"/>
+          <ac:spMkLst>
+            <pc:docMk/>
+            <pc:sldMk cId="2968666269" sldId="315"/>
+            <ac:spMk id="4" creationId="{87630955-1BA8-0A8E-24F0-331AD6A6AB22}"/>
+          </ac:spMkLst>
+        </pc:spChg>
+        <pc:spChg chg="add mod ord">
+          <ac:chgData name="Naman" userId="583bf7a4a802f89e" providerId="LiveId" clId="{D06AEFC2-249C-44B6-9FF9-821C13C26D7C}" dt="2022-10-15T14:59:58.710" v="1" actId="14100"/>
+          <ac:spMkLst>
+            <pc:docMk/>
+            <pc:sldMk cId="2968666269" sldId="315"/>
+            <ac:spMk id="5" creationId="{50F7DCFD-96CD-DAE0-76D1-3C19DFE0758B}"/>
+          </ac:spMkLst>
+        </pc:spChg>
+        <pc:spChg chg="add del mod ord">
+          <ac:chgData name="Naman" userId="583bf7a4a802f89e" providerId="LiveId" clId="{D06AEFC2-249C-44B6-9FF9-821C13C26D7C}" dt="2022-10-15T15:08:16.611" v="71" actId="478"/>
+          <ac:spMkLst>
+            <pc:docMk/>
+            <pc:sldMk cId="2968666269" sldId="315"/>
+            <ac:spMk id="6" creationId="{FEC39A7C-772F-D169-C0DD-9355C6DAB094}"/>
+          </ac:spMkLst>
+        </pc:spChg>
+        <pc:spChg chg="add del mod ord">
+          <ac:chgData name="Naman" userId="583bf7a4a802f89e" providerId="LiveId" clId="{D06AEFC2-249C-44B6-9FF9-821C13C26D7C}" dt="2022-10-15T15:08:18.764" v="72" actId="478"/>
+          <ac:spMkLst>
+            <pc:docMk/>
+            <pc:sldMk cId="2968666269" sldId="315"/>
+            <ac:spMk id="7" creationId="{22EB7A84-6A06-029B-E058-244715034A3F}"/>
+          </ac:spMkLst>
+        </pc:spChg>
+        <pc:spChg chg="add del mod">
+          <ac:chgData name="Naman" userId="583bf7a4a802f89e" providerId="LiveId" clId="{D06AEFC2-249C-44B6-9FF9-821C13C26D7C}" dt="2022-10-15T15:04:09.526" v="61" actId="478"/>
+          <ac:spMkLst>
+            <pc:docMk/>
+            <pc:sldMk cId="2968666269" sldId="315"/>
+            <ac:spMk id="8" creationId="{FA934C8E-81D7-F332-F75D-BAD293D17CAB}"/>
+          </ac:spMkLst>
+        </pc:spChg>
+        <pc:spChg chg="add del mod">
+          <ac:chgData name="Naman" userId="583bf7a4a802f89e" providerId="LiveId" clId="{D06AEFC2-249C-44B6-9FF9-821C13C26D7C}" dt="2022-10-15T15:01:39.639" v="20" actId="767"/>
+          <ac:spMkLst>
+            <pc:docMk/>
+            <pc:sldMk cId="2968666269" sldId="315"/>
+            <ac:spMk id="9" creationId="{5FF7919A-CCE4-7EC8-B4FB-852294D918D8}"/>
+          </ac:spMkLst>
+        </pc:spChg>
+        <pc:spChg chg="add del mod">
+          <ac:chgData name="Naman" userId="583bf7a4a802f89e" providerId="LiveId" clId="{D06AEFC2-249C-44B6-9FF9-821C13C26D7C}" dt="2022-10-15T15:01:57.369" v="23"/>
+          <ac:spMkLst>
+            <pc:docMk/>
+            <pc:sldMk cId="2968666269" sldId="315"/>
+            <ac:spMk id="10" creationId="{61B83A19-B859-B926-D408-568411F88467}"/>
+          </ac:spMkLst>
+        </pc:spChg>
+        <pc:spChg chg="add mod">
+          <ac:chgData name="Naman" userId="583bf7a4a802f89e" providerId="LiveId" clId="{D06AEFC2-249C-44B6-9FF9-821C13C26D7C}" dt="2022-10-15T15:08:11.437" v="69"/>
+          <ac:spMkLst>
+            <pc:docMk/>
+            <pc:sldMk cId="2968666269" sldId="315"/>
+            <ac:spMk id="11" creationId="{A937BA98-3F5F-5CD1-35FE-B63CC30D217E}"/>
+          </ac:spMkLst>
+        </pc:spChg>
+        <pc:spChg chg="add mod">
+          <ac:chgData name="Naman" userId="583bf7a4a802f89e" providerId="LiveId" clId="{D06AEFC2-249C-44B6-9FF9-821C13C26D7C}" dt="2022-10-15T15:08:11.437" v="69"/>
+          <ac:spMkLst>
+            <pc:docMk/>
+            <pc:sldMk cId="2968666269" sldId="315"/>
+            <ac:spMk id="12" creationId="{02697344-065C-9EA0-CA92-EB8DED05899F}"/>
+          </ac:spMkLst>
+        </pc:spChg>
+        <pc:spChg chg="add del mod">
+          <ac:chgData name="Naman" userId="583bf7a4a802f89e" providerId="LiveId" clId="{D06AEFC2-249C-44B6-9FF9-821C13C26D7C}" dt="2022-10-15T15:13:42.274" v="211" actId="478"/>
+          <ac:spMkLst>
+            <pc:docMk/>
+            <pc:sldMk cId="2968666269" sldId="315"/>
+            <ac:spMk id="13" creationId="{82D0C425-DA78-27A0-AF08-619D6DBD846A}"/>
+          </ac:spMkLst>
+        </pc:spChg>
+        <pc:spChg chg="add mod">
+          <ac:chgData name="Naman" userId="583bf7a4a802f89e" providerId="LiveId" clId="{D06AEFC2-249C-44B6-9FF9-821C13C26D7C}" dt="2022-10-15T15:10:28.100" v="95" actId="20577"/>
+          <ac:spMkLst>
+            <pc:docMk/>
+            <pc:sldMk cId="2968666269" sldId="315"/>
+            <ac:spMk id="14" creationId="{9AF850D9-62C2-4DC0-FAFD-2D3B0B4994EF}"/>
+          </ac:spMkLst>
+        </pc:spChg>
+        <pc:spChg chg="add mod">
+          <ac:chgData name="Naman" userId="583bf7a4a802f89e" providerId="LiveId" clId="{D06AEFC2-249C-44B6-9FF9-821C13C26D7C}" dt="2022-10-15T15:09:07.996" v="80"/>
+          <ac:spMkLst>
+            <pc:docMk/>
+            <pc:sldMk cId="2968666269" sldId="315"/>
+            <ac:spMk id="15" creationId="{2F662F5C-AC07-A098-DF9D-2C0DAF81770B}"/>
+          </ac:spMkLst>
+        </pc:spChg>
+        <pc:spChg chg="add mod">
+          <ac:chgData name="Naman" userId="583bf7a4a802f89e" providerId="LiveId" clId="{D06AEFC2-249C-44B6-9FF9-821C13C26D7C}" dt="2022-10-15T15:09:07.996" v="80"/>
+          <ac:spMkLst>
+            <pc:docMk/>
+            <pc:sldMk cId="2968666269" sldId="315"/>
+            <ac:spMk id="16" creationId="{AD339105-D50A-B79B-5E1E-8B25F77CCBFE}"/>
+          </ac:spMkLst>
+        </pc:spChg>
+        <pc:spChg chg="add mod">
+          <ac:chgData name="Naman" userId="583bf7a4a802f89e" providerId="LiveId" clId="{D06AEFC2-249C-44B6-9FF9-821C13C26D7C}" dt="2022-10-15T15:09:22.365" v="85" actId="20577"/>
+          <ac:spMkLst>
+            <pc:docMk/>
+            <pc:sldMk cId="2968666269" sldId="315"/>
+            <ac:spMk id="17" creationId="{E5761393-E549-152D-887C-FEAC30790328}"/>
+          </ac:spMkLst>
+        </pc:spChg>
+        <pc:spChg chg="add mod">
+          <ac:chgData name="Naman" userId="583bf7a4a802f89e" providerId="LiveId" clId="{D06AEFC2-249C-44B6-9FF9-821C13C26D7C}" dt="2022-10-15T15:16:09.053" v="296" actId="20577"/>
+          <ac:spMkLst>
+            <pc:docMk/>
+            <pc:sldMk cId="2968666269" sldId="315"/>
+            <ac:spMk id="18" creationId="{FCE161C2-F1C4-DCDF-530D-82ED14702499}"/>
+          </ac:spMkLst>
+        </pc:spChg>
+        <pc:spChg chg="add mod">
+          <ac:chgData name="Naman" userId="583bf7a4a802f89e" providerId="LiveId" clId="{D06AEFC2-249C-44B6-9FF9-821C13C26D7C}" dt="2022-10-15T15:16:20.210" v="325" actId="20577"/>
+          <ac:spMkLst>
+            <pc:docMk/>
+            <pc:sldMk cId="2968666269" sldId="315"/>
+            <ac:spMk id="19" creationId="{DFD4C4D4-F1B3-8216-287C-74814B3858F8}"/>
+          </ac:spMkLst>
+        </pc:spChg>
+      </pc:sldChg>
+      <pc:sldChg chg="modSp mod">
+        <pc:chgData name="Naman" userId="583bf7a4a802f89e" providerId="LiveId" clId="{D06AEFC2-249C-44B6-9FF9-821C13C26D7C}" dt="2022-10-15T15:13:20.364" v="209" actId="2711"/>
+        <pc:sldMkLst>
+          <pc:docMk/>
+          <pc:sldMk cId="894477276" sldId="316"/>
+        </pc:sldMkLst>
+        <pc:spChg chg="mod">
+          <ac:chgData name="Naman" userId="583bf7a4a802f89e" providerId="LiveId" clId="{D06AEFC2-249C-44B6-9FF9-821C13C26D7C}" dt="2022-10-15T15:13:20.364" v="209" actId="2711"/>
+          <ac:spMkLst>
+            <pc:docMk/>
+            <pc:sldMk cId="894477276" sldId="316"/>
+            <ac:spMk id="2" creationId="{1699474F-4A5C-4CCD-2327-CE59240B2E66}"/>
+          </ac:spMkLst>
+        </pc:spChg>
+        <pc:spChg chg="mod">
+          <ac:chgData name="Naman" userId="583bf7a4a802f89e" providerId="LiveId" clId="{D06AEFC2-249C-44B6-9FF9-821C13C26D7C}" dt="2022-10-15T15:12:25.568" v="201" actId="255"/>
+          <ac:spMkLst>
+            <pc:docMk/>
+            <pc:sldMk cId="894477276" sldId="316"/>
+            <ac:spMk id="3" creationId="{AACAA18B-1325-679A-9875-096C6CB87223}"/>
+          </ac:spMkLst>
+        </pc:spChg>
+      </pc:sldChg>
+      <pc:sldChg chg="addSp delSp modSp mod modClrScheme chgLayout">
+        <pc:chgData name="Naman" userId="583bf7a4a802f89e" providerId="LiveId" clId="{D06AEFC2-249C-44B6-9FF9-821C13C26D7C}" dt="2022-10-15T15:16:32.385" v="326" actId="700"/>
+        <pc:sldMkLst>
+          <pc:docMk/>
+          <pc:sldMk cId="687452228" sldId="317"/>
+        </pc:sldMkLst>
+        <pc:spChg chg="mod ord">
+          <ac:chgData name="Naman" userId="583bf7a4a802f89e" providerId="LiveId" clId="{D06AEFC2-249C-44B6-9FF9-821C13C26D7C}" dt="2022-10-15T15:16:32.385" v="326" actId="700"/>
+          <ac:spMkLst>
+            <pc:docMk/>
+            <pc:sldMk cId="687452228" sldId="317"/>
+            <ac:spMk id="2" creationId="{181B6C67-6420-6592-2BA6-C0791CF45387}"/>
+          </ac:spMkLst>
+        </pc:spChg>
+        <pc:spChg chg="del mod ord">
+          <ac:chgData name="Naman" userId="583bf7a4a802f89e" providerId="LiveId" clId="{D06AEFC2-249C-44B6-9FF9-821C13C26D7C}" dt="2022-10-15T15:16:32.385" v="326" actId="700"/>
+          <ac:spMkLst>
+            <pc:docMk/>
+            <pc:sldMk cId="687452228" sldId="317"/>
+            <ac:spMk id="3" creationId="{EA9DE1E7-BB80-D501-6674-87DBFD81EF91}"/>
+          </ac:spMkLst>
+        </pc:spChg>
+        <pc:spChg chg="add mod ord">
+          <ac:chgData name="Naman" userId="583bf7a4a802f89e" providerId="LiveId" clId="{D06AEFC2-249C-44B6-9FF9-821C13C26D7C}" dt="2022-10-15T15:16:32.385" v="326" actId="700"/>
+          <ac:spMkLst>
+            <pc:docMk/>
+            <pc:sldMk cId="687452228" sldId="317"/>
+            <ac:spMk id="4" creationId="{67C59745-765F-7D5A-DED8-FCF4CBBCD9A7}"/>
+          </ac:spMkLst>
+        </pc:spChg>
+        <pc:spChg chg="add mod ord">
+          <ac:chgData name="Naman" userId="583bf7a4a802f89e" providerId="LiveId" clId="{D06AEFC2-249C-44B6-9FF9-821C13C26D7C}" dt="2022-10-15T15:16:32.385" v="326" actId="700"/>
+          <ac:spMkLst>
+            <pc:docMk/>
+            <pc:sldMk cId="687452228" sldId="317"/>
+            <ac:spMk id="5" creationId="{11C4F4D3-EC3E-8F33-2AE6-8FC25AC84ACA}"/>
+          </ac:spMkLst>
+        </pc:spChg>
+      </pc:sldChg>
+      <pc:sldChg chg="addSp delSp modSp new del mod chgLayout">
+        <pc:chgData name="Naman" userId="583bf7a4a802f89e" providerId="LiveId" clId="{D06AEFC2-249C-44B6-9FF9-821C13C26D7C}" dt="2022-10-15T15:05:41.480" v="68" actId="47"/>
+        <pc:sldMkLst>
+          <pc:docMk/>
+          <pc:sldMk cId="4202390259" sldId="318"/>
+        </pc:sldMkLst>
+        <pc:spChg chg="del">
+          <ac:chgData name="Naman" userId="583bf7a4a802f89e" providerId="LiveId" clId="{D06AEFC2-249C-44B6-9FF9-821C13C26D7C}" dt="2022-10-15T15:05:19.771" v="65" actId="700"/>
+          <ac:spMkLst>
+            <pc:docMk/>
+            <pc:sldMk cId="4202390259" sldId="318"/>
+            <ac:spMk id="2" creationId="{5C3EC986-CD71-F24B-F49C-F956523232D9}"/>
+          </ac:spMkLst>
+        </pc:spChg>
+        <pc:spChg chg="del">
+          <ac:chgData name="Naman" userId="583bf7a4a802f89e" providerId="LiveId" clId="{D06AEFC2-249C-44B6-9FF9-821C13C26D7C}" dt="2022-10-15T15:05:19.771" v="65" actId="700"/>
+          <ac:spMkLst>
+            <pc:docMk/>
+            <pc:sldMk cId="4202390259" sldId="318"/>
+            <ac:spMk id="3" creationId="{777EFEF3-648B-FC30-00D0-434BEA66D75B}"/>
+          </ac:spMkLst>
+        </pc:spChg>
+        <pc:spChg chg="del">
+          <ac:chgData name="Naman" userId="583bf7a4a802f89e" providerId="LiveId" clId="{D06AEFC2-249C-44B6-9FF9-821C13C26D7C}" dt="2022-10-15T15:05:19.771" v="65" actId="700"/>
+          <ac:spMkLst>
+            <pc:docMk/>
+            <pc:sldMk cId="4202390259" sldId="318"/>
+            <ac:spMk id="4" creationId="{DEA5B385-8035-FA27-6544-3DE6DC6799CE}"/>
+          </ac:spMkLst>
+        </pc:spChg>
+        <pc:spChg chg="del">
+          <ac:chgData name="Naman" userId="583bf7a4a802f89e" providerId="LiveId" clId="{D06AEFC2-249C-44B6-9FF9-821C13C26D7C}" dt="2022-10-15T15:05:19.771" v="65" actId="700"/>
+          <ac:spMkLst>
+            <pc:docMk/>
+            <pc:sldMk cId="4202390259" sldId="318"/>
+            <ac:spMk id="5" creationId="{F65C24C4-3BC4-FBD6-7EDF-DBE9DD9FEE79}"/>
+          </ac:spMkLst>
+        </pc:spChg>
+        <pc:spChg chg="del">
+          <ac:chgData name="Naman" userId="583bf7a4a802f89e" providerId="LiveId" clId="{D06AEFC2-249C-44B6-9FF9-821C13C26D7C}" dt="2022-10-15T15:05:19.771" v="65" actId="700"/>
+          <ac:spMkLst>
+            <pc:docMk/>
+            <pc:sldMk cId="4202390259" sldId="318"/>
+            <ac:spMk id="6" creationId="{A37AA533-9BC6-0E92-523A-331B5DAF6EAC}"/>
+          </ac:spMkLst>
+        </pc:spChg>
+        <pc:spChg chg="add mod ord">
+          <ac:chgData name="Naman" userId="583bf7a4a802f89e" providerId="LiveId" clId="{D06AEFC2-249C-44B6-9FF9-821C13C26D7C}" dt="2022-10-15T15:05:19.771" v="65" actId="700"/>
+          <ac:spMkLst>
+            <pc:docMk/>
+            <pc:sldMk cId="4202390259" sldId="318"/>
+            <ac:spMk id="7" creationId="{7EFFB45C-4F1B-A6DA-4E65-263284FDB9D3}"/>
+          </ac:spMkLst>
+        </pc:spChg>
+        <pc:spChg chg="add mod ord">
+          <ac:chgData name="Naman" userId="583bf7a4a802f89e" providerId="LiveId" clId="{D06AEFC2-249C-44B6-9FF9-821C13C26D7C}" dt="2022-10-15T15:05:19.771" v="65" actId="700"/>
+          <ac:spMkLst>
+            <pc:docMk/>
+            <pc:sldMk cId="4202390259" sldId="318"/>
+            <ac:spMk id="8" creationId="{C05E5619-F498-65EE-1421-BEF041C90085}"/>
+          </ac:spMkLst>
+        </pc:spChg>
+        <pc:spChg chg="add mod ord">
+          <ac:chgData name="Naman" userId="583bf7a4a802f89e" providerId="LiveId" clId="{D06AEFC2-249C-44B6-9FF9-821C13C26D7C}" dt="2022-10-15T15:05:19.771" v="65" actId="700"/>
+          <ac:spMkLst>
+            <pc:docMk/>
+            <pc:sldMk cId="4202390259" sldId="318"/>
+            <ac:spMk id="9" creationId="{AAF7EADF-4195-0704-6A97-74051B94C3C1}"/>
+          </ac:spMkLst>
+        </pc:spChg>
+        <pc:spChg chg="add del mod ord">
+          <ac:chgData name="Naman" userId="583bf7a4a802f89e" providerId="LiveId" clId="{D06AEFC2-249C-44B6-9FF9-821C13C26D7C}" dt="2022-10-15T15:05:33.376" v="67" actId="478"/>
+          <ac:spMkLst>
+            <pc:docMk/>
+            <pc:sldMk cId="4202390259" sldId="318"/>
+            <ac:spMk id="10" creationId="{1EDCAD54-77A2-241A-DA6E-CEE9805C574F}"/>
+          </ac:spMkLst>
+        </pc:spChg>
+        <pc:spChg chg="add mod ord">
+          <ac:chgData name="Naman" userId="583bf7a4a802f89e" providerId="LiveId" clId="{D06AEFC2-249C-44B6-9FF9-821C13C26D7C}" dt="2022-10-15T15:05:19.771" v="65" actId="700"/>
+          <ac:spMkLst>
+            <pc:docMk/>
+            <pc:sldMk cId="4202390259" sldId="318"/>
+            <ac:spMk id="11" creationId="{2D881ED0-FF1B-1E65-7EEC-A4DA70456D97}"/>
+          </ac:spMkLst>
+        </pc:spChg>
+      </pc:sldChg>
+    </pc:docChg>
+  </pc:docChgLst>
+</pc:chgInfo>
+</file>
+
 <file path=ppt/notesMasters/notesMaster1.xml><?xml version="1.0" encoding="utf-8"?>
 <p:notesMaster xmlns:a="http://schemas.openxmlformats.org/drawingml/2006/main" xmlns:r="http://schemas.openxmlformats.org/officeDocument/2006/relationships" xmlns:p="http://schemas.openxmlformats.org/presentationml/2006/main">
   <p:cSld>
@@ -202,7 +562,7 @@
           <a:p>
             <a:fld id="{CC6DBDFE-DD3D-4291-A404-1B97A83A6EA8}" type="datetimeFigureOut">
               <a:rPr lang="en-US" smtClean="0"/>
-              <a:t>10/14/2022</a:t>
+              <a:t>10/15/2022</a:t>
             </a:fld>
             <a:endParaRPr lang="en-US" dirty="0"/>
           </a:p>
@@ -1082,7 +1442,7 @@
           <a:p>
             <a:fld id="{EA0C0817-A112-4847-8014-A94B7D2A4EA3}" type="datetime1">
               <a:rPr lang="en-US" smtClean="0"/>
-              <a:t>10/14/2022</a:t>
+              <a:t>10/15/2022</a:t>
             </a:fld>
             <a:endParaRPr lang="en-US" dirty="0"/>
           </a:p>
@@ -1284,7 +1644,7 @@
           <a:p>
             <a:fld id="{7332B432-ACDA-4023-A761-2BAB76577B62}" type="datetime1">
               <a:rPr lang="en-US" smtClean="0"/>
-              <a:t>10/14/2022</a:t>
+              <a:t>10/15/2022</a:t>
             </a:fld>
             <a:endParaRPr lang="en-US" dirty="0"/>
           </a:p>
@@ -1883,7 +2243,7 @@
           <a:p>
             <a:fld id="{D9C646AA-F36E-4540-911D-FFFC0A0EF24A}" type="datetime1">
               <a:rPr lang="en-US" smtClean="0"/>
-              <a:t>10/14/2022</a:t>
+              <a:t>10/15/2022</a:t>
             </a:fld>
             <a:endParaRPr lang="en-US" dirty="0"/>
           </a:p>
@@ -2203,7 +2563,7 @@
           <a:p>
             <a:fld id="{69186D26-FA5F-4637-B602-B7C2DC34CFD4}" type="datetime1">
               <a:rPr lang="en-US" smtClean="0"/>
-              <a:t>10/14/2022</a:t>
+              <a:t>10/15/2022</a:t>
             </a:fld>
             <a:endParaRPr lang="en-US" dirty="0"/>
           </a:p>
@@ -2640,7 +3000,7 @@
           <a:p>
             <a:fld id="{8A7F15D8-96D1-4781-BC50-CA8A088B2FE4}" type="datetime1">
               <a:rPr lang="en-US" smtClean="0"/>
-              <a:t>10/14/2022</a:t>
+              <a:t>10/15/2022</a:t>
             </a:fld>
             <a:endParaRPr lang="en-US" dirty="0"/>
           </a:p>
@@ -2758,7 +3118,7 @@
           <a:p>
             <a:fld id="{F9A96C99-B8F8-4528-BD05-0E16E943DC09}" type="datetime1">
               <a:rPr lang="en-US" smtClean="0"/>
-              <a:t>10/14/2022</a:t>
+              <a:t>10/15/2022</a:t>
             </a:fld>
             <a:endParaRPr lang="en-US" dirty="0"/>
           </a:p>
@@ -2853,7 +3213,7 @@
           <a:p>
             <a:fld id="{03636942-C211-4B28-8DBD-C953E00AF71B}" type="datetime1">
               <a:rPr lang="en-US" smtClean="0"/>
-              <a:t>10/14/2022</a:t>
+              <a:t>10/15/2022</a:t>
             </a:fld>
             <a:endParaRPr lang="en-US" dirty="0"/>
           </a:p>
@@ -3270,7 +3630,7 @@
           <a:p>
             <a:fld id="{7E8D12A6-918A-48BD-8CB9-CA713993B0EA}" type="datetime1">
               <a:rPr lang="en-US" smtClean="0"/>
-              <a:t>10/14/2022</a:t>
+              <a:t>10/15/2022</a:t>
             </a:fld>
             <a:endParaRPr lang="en-US" dirty="0"/>
           </a:p>
@@ -3532,7 +3892,7 @@
             <a:fld id="{E778CE86-875F-4587-BCF6-FA054AFC0D53}" type="datetime1">
               <a:rPr lang="en-US" smtClean="0"/>
               <a:pPr/>
-              <a:t>10/14/2022</a:t>
+              <a:t>10/15/2022</a:t>
             </a:fld>
             <a:endParaRPr lang="en-US" dirty="0"/>
           </a:p>
@@ -4048,7 +4408,7 @@
           <a:p>
             <a:fld id="{F6FA2B21-3FCD-4721-B95C-427943F61125}" type="datetime1">
               <a:rPr lang="en-US" smtClean="0"/>
-              <a:t>10/14/2022</a:t>
+              <a:t>10/15/2022</a:t>
             </a:fld>
             <a:endParaRPr lang="en-US" dirty="0"/>
           </a:p>
@@ -5015,7 +5375,9 @@
           <a:lstStyle/>
           <a:p>
             <a:r>
-              <a:rPr lang="en-US" dirty="0"/>
+              <a:rPr lang="en-US" dirty="0">
+                <a:latin typeface="Algerian" panose="04020705040A02060702" pitchFamily="82" charset="0"/>
+              </a:rPr>
               <a:t>Introduction</a:t>
             </a:r>
           </a:p>
@@ -5039,13 +5401,18 @@
         </p:nvSpPr>
         <p:spPr/>
         <p:txBody>
-          <a:bodyPr/>
+          <a:bodyPr>
+            <a:normAutofit/>
+          </a:bodyPr>
           <a:lstStyle/>
           <a:p>
             <a:pPr marL="0" indent="0">
               <a:buNone/>
             </a:pPr>
-            <a:endParaRPr lang="en-US" dirty="0"/>
+            <a:r>
+              <a:rPr lang="en-US" sz="2000" dirty="0"/>
+              <a:t>During the course of this project, we plan on making a completely functioning website to make it easy to find anyone’s lost belongings. WE plan on trying to make it as intuitive yet sophisticated as possible for the users of the website. This is extremely practical and reliable for everyone as we race against time everyday and happen to lose our things often. Taking inspiration from our college itself, we decided to make a platform where issues of losing stuff becomes easy to sort out.  Also, this will help us hone our skills about managing and working with databases and DBMS, which is a very fruitful skill for someone in  the IT industry to have. Hopefully, we will be able to make a working website and more so a good one.</a:t>
+            </a:r>
           </a:p>
         </p:txBody>
       </p:sp>
@@ -5101,7 +5468,9 @@
           <a:lstStyle/>
           <a:p>
             <a:r>
-              <a:rPr lang="en-US" dirty="0"/>
+              <a:rPr lang="en-US" dirty="0">
+                <a:latin typeface="Algerian" panose="04020705040A02060702" pitchFamily="82" charset="0"/>
+              </a:rPr>
               <a:t>Purpose and Scope</a:t>
             </a:r>
           </a:p>
@@ -5129,13 +5498,13 @@
           <a:lstStyle/>
           <a:p>
             <a:r>
-              <a:rPr lang="en-US" dirty="0"/>
+              <a:rPr lang="en-US" sz="2000" dirty="0"/>
               <a:t>On a daily basis we receive a flood of lost and found mails, making it hard to spot the important e-mails. As a student or an employee out in the corporate world as well, missing important mails can be disastrous for one’s careers. </a:t>
             </a:r>
           </a:p>
           <a:p>
             <a:r>
-              <a:rPr lang="en-US" dirty="0"/>
+              <a:rPr lang="en-US" sz="2000" dirty="0"/>
               <a:t>Moreover, if someone wants to find a mail from a while back it is extremely tedious to scroll all the way up, where one can easily miss the mail as well. Therefore, we need something to keep all this well organized.</a:t>
             </a:r>
           </a:p>
@@ -5144,7 +5513,7 @@
               <a:buNone/>
             </a:pPr>
             <a:r>
-              <a:rPr lang="en-US" dirty="0"/>
+              <a:rPr lang="en-US" sz="2000" dirty="0"/>
               <a:t>To solve this problem, we are trying to make a full functioning website that can help keep the lost and found organized.</a:t>
             </a:r>
           </a:p>
@@ -5205,7 +5574,9 @@
           <a:lstStyle/>
           <a:p>
             <a:r>
-              <a:rPr lang="en-US" dirty="0"/>
+              <a:rPr lang="en-US" dirty="0">
+                <a:latin typeface="Algerian" panose="04020705040A02060702" pitchFamily="82" charset="0"/>
+              </a:rPr>
               <a:t>Overall Description</a:t>
             </a:r>
           </a:p>
@@ -5213,10 +5584,10 @@
       </p:sp>
       <p:sp>
         <p:nvSpPr>
-          <p:cNvPr id="3" name="Content Placeholder 2">
+          <p:cNvPr id="4" name="Text Placeholder 3">
             <a:extLst>
               <a:ext uri="{FF2B5EF4-FFF2-40B4-BE49-F238E27FC236}">
-                <a16:creationId xmlns:a16="http://schemas.microsoft.com/office/drawing/2014/main" id="{FD65181C-BE51-0FAB-DA0E-2341F643C9E7}"/>
+                <a16:creationId xmlns:a16="http://schemas.microsoft.com/office/drawing/2014/main" id="{87630955-1BA8-0A8E-24F0-331AD6A6AB22}"/>
               </a:ext>
             </a:extLst>
           </p:cNvPr>
@@ -5224,15 +5595,1585 @@
             <a:spLocks noGrp="1"/>
           </p:cNvSpPr>
           <p:nvPr>
-            <p:ph idx="1"/>
+            <p:ph type="body" idx="1"/>
           </p:nvPr>
         </p:nvSpPr>
-        <p:spPr/>
+        <p:spPr>
+          <a:xfrm>
+            <a:off x="1069848" y="2074334"/>
+            <a:ext cx="3219348" cy="640080"/>
+          </a:xfrm>
+        </p:spPr>
+        <p:txBody>
+          <a:bodyPr>
+            <a:normAutofit fontScale="92500" lnSpcReduction="10000"/>
+          </a:bodyPr>
+          <a:lstStyle/>
+          <a:p>
+            <a:r>
+              <a:rPr lang="en-US" dirty="0"/>
+              <a:t>System features and requirements</a:t>
+            </a:r>
+          </a:p>
+        </p:txBody>
+      </p:sp>
+      <p:sp>
+        <p:nvSpPr>
+          <p:cNvPr id="5" name="Content Placeholder 4">
+            <a:extLst>
+              <a:ext uri="{FF2B5EF4-FFF2-40B4-BE49-F238E27FC236}">
+                <a16:creationId xmlns:a16="http://schemas.microsoft.com/office/drawing/2014/main" id="{50F7DCFD-96CD-DAE0-76D1-3C19DFE0758B}"/>
+              </a:ext>
+            </a:extLst>
+          </p:cNvPr>
+          <p:cNvSpPr>
+            <a:spLocks noGrp="1"/>
+          </p:cNvSpPr>
+          <p:nvPr>
+            <p:ph sz="half" idx="2"/>
+          </p:nvPr>
+        </p:nvSpPr>
+        <p:spPr>
+          <a:xfrm>
+            <a:off x="1069848" y="2792472"/>
+            <a:ext cx="3219348" cy="3163825"/>
+          </a:xfrm>
+        </p:spPr>
         <p:txBody>
           <a:bodyPr/>
           <a:lstStyle/>
           <a:p>
-            <a:endParaRPr lang="en-US"/>
+            <a:endParaRPr lang="en-US" dirty="0"/>
+          </a:p>
+        </p:txBody>
+      </p:sp>
+      <p:sp>
+        <p:nvSpPr>
+          <p:cNvPr id="11" name="Text Placeholder 3">
+            <a:extLst>
+              <a:ext uri="{FF2B5EF4-FFF2-40B4-BE49-F238E27FC236}">
+                <a16:creationId xmlns:a16="http://schemas.microsoft.com/office/drawing/2014/main" id="{A937BA98-3F5F-5CD1-35FE-B63CC30D217E}"/>
+              </a:ext>
+            </a:extLst>
+          </p:cNvPr>
+          <p:cNvSpPr txBox="1">
+            <a:spLocks/>
+          </p:cNvSpPr>
+          <p:nvPr/>
+        </p:nvSpPr>
+        <p:spPr>
+          <a:xfrm>
+            <a:off x="1222248" y="2226734"/>
+            <a:ext cx="3219348" cy="640080"/>
+          </a:xfrm>
+          <a:prstGeom prst="rect">
+            <a:avLst/>
+          </a:prstGeom>
+        </p:spPr>
+        <p:txBody>
+          <a:bodyPr vert="horz" lIns="91440" tIns="45720" rIns="91440" bIns="45720" rtlCol="0" anchor="ctr">
+            <a:normAutofit/>
+          </a:bodyPr>
+          <a:lstStyle>
+            <a:lvl1pPr marL="0" indent="0" algn="l" defTabSz="914400" rtl="0" eaLnBrk="1" latinLnBrk="0" hangingPunct="1">
+              <a:lnSpc>
+                <a:spcPct val="110000"/>
+              </a:lnSpc>
+              <a:spcBef>
+                <a:spcPts val="0"/>
+              </a:spcBef>
+              <a:spcAft>
+                <a:spcPts val="0"/>
+              </a:spcAft>
+              <a:buClr>
+                <a:schemeClr val="tx1">
+                  <a:lumMod val="85000"/>
+                  <a:lumOff val="15000"/>
+                </a:schemeClr>
+              </a:buClr>
+              <a:buFont typeface="Garamond" pitchFamily="18" charset="0"/>
+              <a:buNone/>
+              <a:defRPr sz="1900" b="1" i="0" kern="1200">
+                <a:solidFill>
+                  <a:schemeClr val="tx1"/>
+                </a:solidFill>
+                <a:latin typeface="+mn-lt"/>
+                <a:ea typeface="+mn-ea"/>
+                <a:cs typeface="+mn-cs"/>
+              </a:defRPr>
+            </a:lvl1pPr>
+            <a:lvl2pPr marL="457200" indent="0" algn="l" defTabSz="914400" rtl="0" eaLnBrk="1" latinLnBrk="0" hangingPunct="1">
+              <a:lnSpc>
+                <a:spcPct val="100000"/>
+              </a:lnSpc>
+              <a:spcBef>
+                <a:spcPts val="500"/>
+              </a:spcBef>
+              <a:buClr>
+                <a:schemeClr val="tx1">
+                  <a:lumMod val="85000"/>
+                  <a:lumOff val="15000"/>
+                </a:schemeClr>
+              </a:buClr>
+              <a:buFont typeface="Garamond" pitchFamily="18" charset="0"/>
+              <a:buNone/>
+              <a:defRPr sz="1800" b="1" kern="1200">
+                <a:solidFill>
+                  <a:schemeClr val="tx1"/>
+                </a:solidFill>
+                <a:latin typeface="+mn-lt"/>
+                <a:ea typeface="+mn-ea"/>
+                <a:cs typeface="+mn-cs"/>
+              </a:defRPr>
+            </a:lvl2pPr>
+            <a:lvl3pPr marL="914400" indent="0" algn="l" defTabSz="914400" rtl="0" eaLnBrk="1" latinLnBrk="0" hangingPunct="1">
+              <a:lnSpc>
+                <a:spcPct val="100000"/>
+              </a:lnSpc>
+              <a:spcBef>
+                <a:spcPts val="500"/>
+              </a:spcBef>
+              <a:buClr>
+                <a:schemeClr val="tx1">
+                  <a:lumMod val="85000"/>
+                  <a:lumOff val="15000"/>
+                </a:schemeClr>
+              </a:buClr>
+              <a:buFont typeface="Garamond" pitchFamily="18" charset="0"/>
+              <a:buNone/>
+              <a:defRPr sz="1800" b="1" kern="1200">
+                <a:solidFill>
+                  <a:schemeClr val="tx1"/>
+                </a:solidFill>
+                <a:latin typeface="+mn-lt"/>
+                <a:ea typeface="+mn-ea"/>
+                <a:cs typeface="+mn-cs"/>
+              </a:defRPr>
+            </a:lvl3pPr>
+            <a:lvl4pPr marL="1371600" indent="0" algn="l" defTabSz="914400" rtl="0" eaLnBrk="1" latinLnBrk="0" hangingPunct="1">
+              <a:lnSpc>
+                <a:spcPct val="100000"/>
+              </a:lnSpc>
+              <a:spcBef>
+                <a:spcPts val="500"/>
+              </a:spcBef>
+              <a:buClr>
+                <a:schemeClr val="tx1">
+                  <a:lumMod val="85000"/>
+                  <a:lumOff val="15000"/>
+                </a:schemeClr>
+              </a:buClr>
+              <a:buFont typeface="Garamond" pitchFamily="18" charset="0"/>
+              <a:buNone/>
+              <a:defRPr sz="1600" b="1" kern="1200">
+                <a:solidFill>
+                  <a:schemeClr val="tx1"/>
+                </a:solidFill>
+                <a:latin typeface="+mn-lt"/>
+                <a:ea typeface="+mn-ea"/>
+                <a:cs typeface="+mn-cs"/>
+              </a:defRPr>
+            </a:lvl4pPr>
+            <a:lvl5pPr marL="1828800" indent="0" algn="l" defTabSz="914400" rtl="0" eaLnBrk="1" latinLnBrk="0" hangingPunct="1">
+              <a:lnSpc>
+                <a:spcPct val="100000"/>
+              </a:lnSpc>
+              <a:spcBef>
+                <a:spcPts val="500"/>
+              </a:spcBef>
+              <a:buClr>
+                <a:schemeClr val="tx1">
+                  <a:lumMod val="85000"/>
+                  <a:lumOff val="15000"/>
+                </a:schemeClr>
+              </a:buClr>
+              <a:buFont typeface="Garamond" pitchFamily="18" charset="0"/>
+              <a:buNone/>
+              <a:defRPr sz="1600" b="1" kern="1200">
+                <a:solidFill>
+                  <a:schemeClr val="tx1"/>
+                </a:solidFill>
+                <a:latin typeface="+mn-lt"/>
+                <a:ea typeface="+mn-ea"/>
+                <a:cs typeface="+mn-cs"/>
+              </a:defRPr>
+            </a:lvl5pPr>
+            <a:lvl6pPr marL="2286000" indent="0" algn="l" defTabSz="914400" rtl="0" eaLnBrk="1" latinLnBrk="0" hangingPunct="1">
+              <a:lnSpc>
+                <a:spcPct val="100000"/>
+              </a:lnSpc>
+              <a:spcBef>
+                <a:spcPts val="500"/>
+              </a:spcBef>
+              <a:buClr>
+                <a:schemeClr val="tx1">
+                  <a:lumMod val="85000"/>
+                  <a:lumOff val="15000"/>
+                </a:schemeClr>
+              </a:buClr>
+              <a:buFont typeface="Garamond" pitchFamily="18" charset="0"/>
+              <a:buNone/>
+              <a:defRPr sz="1600" b="1" kern="1200">
+                <a:solidFill>
+                  <a:schemeClr val="tx1"/>
+                </a:solidFill>
+                <a:latin typeface="+mn-lt"/>
+                <a:ea typeface="+mn-ea"/>
+                <a:cs typeface="+mn-cs"/>
+              </a:defRPr>
+            </a:lvl6pPr>
+            <a:lvl7pPr marL="2743200" indent="0" algn="l" defTabSz="914400" rtl="0" eaLnBrk="1" latinLnBrk="0" hangingPunct="1">
+              <a:lnSpc>
+                <a:spcPct val="100000"/>
+              </a:lnSpc>
+              <a:spcBef>
+                <a:spcPts val="500"/>
+              </a:spcBef>
+              <a:buClr>
+                <a:schemeClr val="tx1">
+                  <a:lumMod val="85000"/>
+                  <a:lumOff val="15000"/>
+                </a:schemeClr>
+              </a:buClr>
+              <a:buFont typeface="Garamond" pitchFamily="18" charset="0"/>
+              <a:buNone/>
+              <a:defRPr sz="1600" b="1" kern="1200">
+                <a:solidFill>
+                  <a:schemeClr val="tx1"/>
+                </a:solidFill>
+                <a:latin typeface="+mn-lt"/>
+                <a:ea typeface="+mn-ea"/>
+                <a:cs typeface="+mn-cs"/>
+              </a:defRPr>
+            </a:lvl7pPr>
+            <a:lvl8pPr marL="3200400" indent="0" algn="l" defTabSz="914400" rtl="0" eaLnBrk="1" latinLnBrk="0" hangingPunct="1">
+              <a:lnSpc>
+                <a:spcPct val="100000"/>
+              </a:lnSpc>
+              <a:spcBef>
+                <a:spcPts val="500"/>
+              </a:spcBef>
+              <a:buClr>
+                <a:schemeClr val="tx1">
+                  <a:lumMod val="85000"/>
+                  <a:lumOff val="15000"/>
+                </a:schemeClr>
+              </a:buClr>
+              <a:buFont typeface="Garamond" pitchFamily="18" charset="0"/>
+              <a:buNone/>
+              <a:defRPr sz="1600" b="1" kern="1200">
+                <a:solidFill>
+                  <a:schemeClr val="tx1"/>
+                </a:solidFill>
+                <a:latin typeface="+mn-lt"/>
+                <a:ea typeface="+mn-ea"/>
+                <a:cs typeface="+mn-cs"/>
+              </a:defRPr>
+            </a:lvl8pPr>
+            <a:lvl9pPr marL="3657600" indent="0" algn="l" defTabSz="914400" rtl="0" eaLnBrk="1" latinLnBrk="0" hangingPunct="1">
+              <a:lnSpc>
+                <a:spcPct val="100000"/>
+              </a:lnSpc>
+              <a:spcBef>
+                <a:spcPts val="500"/>
+              </a:spcBef>
+              <a:buClr>
+                <a:schemeClr val="tx1">
+                  <a:lumMod val="85000"/>
+                  <a:lumOff val="15000"/>
+                </a:schemeClr>
+              </a:buClr>
+              <a:buFont typeface="Garamond" pitchFamily="18" charset="0"/>
+              <a:buNone/>
+              <a:defRPr sz="1600" b="1" kern="1200">
+                <a:solidFill>
+                  <a:schemeClr val="tx1"/>
+                </a:solidFill>
+                <a:latin typeface="+mn-lt"/>
+                <a:ea typeface="+mn-ea"/>
+                <a:cs typeface="+mn-cs"/>
+              </a:defRPr>
+            </a:lvl9pPr>
+          </a:lstStyle>
+          <a:p>
+            <a:endParaRPr lang="en-US" dirty="0"/>
+          </a:p>
+        </p:txBody>
+      </p:sp>
+      <p:sp>
+        <p:nvSpPr>
+          <p:cNvPr id="12" name="Content Placeholder 4">
+            <a:extLst>
+              <a:ext uri="{FF2B5EF4-FFF2-40B4-BE49-F238E27FC236}">
+                <a16:creationId xmlns:a16="http://schemas.microsoft.com/office/drawing/2014/main" id="{02697344-065C-9EA0-CA92-EB8DED05899F}"/>
+              </a:ext>
+            </a:extLst>
+          </p:cNvPr>
+          <p:cNvSpPr txBox="1">
+            <a:spLocks/>
+          </p:cNvSpPr>
+          <p:nvPr/>
+        </p:nvSpPr>
+        <p:spPr>
+          <a:xfrm>
+            <a:off x="1222248" y="2944872"/>
+            <a:ext cx="3219348" cy="3163825"/>
+          </a:xfrm>
+          <a:prstGeom prst="rect">
+            <a:avLst/>
+          </a:prstGeom>
+        </p:spPr>
+        <p:txBody>
+          <a:bodyPr vert="horz" lIns="91440" tIns="45720" rIns="91440" bIns="45720" rtlCol="0">
+            <a:normAutofit/>
+          </a:bodyPr>
+          <a:lstStyle>
+            <a:lvl1pPr marL="182880" indent="-182880" algn="l" defTabSz="914400" rtl="0" eaLnBrk="1" latinLnBrk="0" hangingPunct="1">
+              <a:lnSpc>
+                <a:spcPct val="110000"/>
+              </a:lnSpc>
+              <a:spcBef>
+                <a:spcPts val="900"/>
+              </a:spcBef>
+              <a:spcAft>
+                <a:spcPts val="0"/>
+              </a:spcAft>
+              <a:buClr>
+                <a:schemeClr val="tx1">
+                  <a:lumMod val="85000"/>
+                  <a:lumOff val="15000"/>
+                </a:schemeClr>
+              </a:buClr>
+              <a:buFont typeface="Garamond" pitchFamily="18" charset="0"/>
+              <a:buChar char="◦"/>
+              <a:defRPr sz="1800" kern="1200">
+                <a:solidFill>
+                  <a:schemeClr val="tx1"/>
+                </a:solidFill>
+                <a:latin typeface="+mn-lt"/>
+                <a:ea typeface="+mn-ea"/>
+                <a:cs typeface="+mn-cs"/>
+              </a:defRPr>
+            </a:lvl1pPr>
+            <a:lvl2pPr marL="457200" indent="-182880" algn="l" defTabSz="914400" rtl="0" eaLnBrk="1" latinLnBrk="0" hangingPunct="1">
+              <a:lnSpc>
+                <a:spcPct val="100000"/>
+              </a:lnSpc>
+              <a:spcBef>
+                <a:spcPts val="500"/>
+              </a:spcBef>
+              <a:buClr>
+                <a:schemeClr val="tx1">
+                  <a:lumMod val="85000"/>
+                  <a:lumOff val="15000"/>
+                </a:schemeClr>
+              </a:buClr>
+              <a:buFont typeface="Garamond" pitchFamily="18" charset="0"/>
+              <a:buChar char="◦"/>
+              <a:defRPr sz="1600" kern="1200">
+                <a:solidFill>
+                  <a:schemeClr val="tx1"/>
+                </a:solidFill>
+                <a:latin typeface="+mn-lt"/>
+                <a:ea typeface="+mn-ea"/>
+                <a:cs typeface="+mn-cs"/>
+              </a:defRPr>
+            </a:lvl2pPr>
+            <a:lvl3pPr marL="731520" indent="-182880" algn="l" defTabSz="914400" rtl="0" eaLnBrk="1" latinLnBrk="0" hangingPunct="1">
+              <a:lnSpc>
+                <a:spcPct val="100000"/>
+              </a:lnSpc>
+              <a:spcBef>
+                <a:spcPts val="500"/>
+              </a:spcBef>
+              <a:buClr>
+                <a:schemeClr val="tx1">
+                  <a:lumMod val="85000"/>
+                  <a:lumOff val="15000"/>
+                </a:schemeClr>
+              </a:buClr>
+              <a:buFont typeface="Garamond" pitchFamily="18" charset="0"/>
+              <a:buChar char="◦"/>
+              <a:defRPr sz="1400" kern="1200">
+                <a:solidFill>
+                  <a:schemeClr val="tx1"/>
+                </a:solidFill>
+                <a:latin typeface="+mn-lt"/>
+                <a:ea typeface="+mn-ea"/>
+                <a:cs typeface="+mn-cs"/>
+              </a:defRPr>
+            </a:lvl3pPr>
+            <a:lvl4pPr marL="1005840" indent="-182880" algn="l" defTabSz="914400" rtl="0" eaLnBrk="1" latinLnBrk="0" hangingPunct="1">
+              <a:lnSpc>
+                <a:spcPct val="100000"/>
+              </a:lnSpc>
+              <a:spcBef>
+                <a:spcPts val="500"/>
+              </a:spcBef>
+              <a:buClr>
+                <a:schemeClr val="tx1">
+                  <a:lumMod val="85000"/>
+                  <a:lumOff val="15000"/>
+                </a:schemeClr>
+              </a:buClr>
+              <a:buFont typeface="Garamond" pitchFamily="18" charset="0"/>
+              <a:buChar char="◦"/>
+              <a:defRPr sz="1400" kern="1200">
+                <a:solidFill>
+                  <a:schemeClr val="tx1"/>
+                </a:solidFill>
+                <a:latin typeface="+mn-lt"/>
+                <a:ea typeface="+mn-ea"/>
+                <a:cs typeface="+mn-cs"/>
+              </a:defRPr>
+            </a:lvl4pPr>
+            <a:lvl5pPr marL="1280160" indent="-182880" algn="l" defTabSz="914400" rtl="0" eaLnBrk="1" latinLnBrk="0" hangingPunct="1">
+              <a:lnSpc>
+                <a:spcPct val="100000"/>
+              </a:lnSpc>
+              <a:spcBef>
+                <a:spcPts val="500"/>
+              </a:spcBef>
+              <a:buClr>
+                <a:schemeClr val="tx1">
+                  <a:lumMod val="85000"/>
+                  <a:lumOff val="15000"/>
+                </a:schemeClr>
+              </a:buClr>
+              <a:buFont typeface="Garamond" pitchFamily="18" charset="0"/>
+              <a:buChar char="◦"/>
+              <a:defRPr sz="1400" kern="1200">
+                <a:solidFill>
+                  <a:schemeClr val="tx1"/>
+                </a:solidFill>
+                <a:latin typeface="+mn-lt"/>
+                <a:ea typeface="+mn-ea"/>
+                <a:cs typeface="+mn-cs"/>
+              </a:defRPr>
+            </a:lvl5pPr>
+            <a:lvl6pPr marL="1600000" indent="-228600" algn="l" defTabSz="914400" rtl="0" eaLnBrk="1" latinLnBrk="0" hangingPunct="1">
+              <a:lnSpc>
+                <a:spcPct val="100000"/>
+              </a:lnSpc>
+              <a:spcBef>
+                <a:spcPts val="500"/>
+              </a:spcBef>
+              <a:buClr>
+                <a:schemeClr val="tx1">
+                  <a:lumMod val="85000"/>
+                  <a:lumOff val="15000"/>
+                </a:schemeClr>
+              </a:buClr>
+              <a:buFont typeface="Garamond" pitchFamily="18" charset="0"/>
+              <a:buChar char="◦"/>
+              <a:defRPr sz="1400" kern="1200">
+                <a:solidFill>
+                  <a:schemeClr val="tx1"/>
+                </a:solidFill>
+                <a:latin typeface="+mn-lt"/>
+                <a:ea typeface="+mn-ea"/>
+                <a:cs typeface="+mn-cs"/>
+              </a:defRPr>
+            </a:lvl6pPr>
+            <a:lvl7pPr marL="1900000" indent="-228600" algn="l" defTabSz="914400" rtl="0" eaLnBrk="1" latinLnBrk="0" hangingPunct="1">
+              <a:lnSpc>
+                <a:spcPct val="100000"/>
+              </a:lnSpc>
+              <a:spcBef>
+                <a:spcPts val="500"/>
+              </a:spcBef>
+              <a:buClr>
+                <a:schemeClr val="tx1">
+                  <a:lumMod val="85000"/>
+                  <a:lumOff val="15000"/>
+                </a:schemeClr>
+              </a:buClr>
+              <a:buFont typeface="Garamond" pitchFamily="18" charset="0"/>
+              <a:buChar char="◦"/>
+              <a:defRPr sz="1400" kern="1200">
+                <a:solidFill>
+                  <a:schemeClr val="tx1"/>
+                </a:solidFill>
+                <a:latin typeface="+mn-lt"/>
+                <a:ea typeface="+mn-ea"/>
+                <a:cs typeface="+mn-cs"/>
+              </a:defRPr>
+            </a:lvl7pPr>
+            <a:lvl8pPr marL="2200000" indent="-228600" algn="l" defTabSz="914400" rtl="0" eaLnBrk="1" latinLnBrk="0" hangingPunct="1">
+              <a:lnSpc>
+                <a:spcPct val="100000"/>
+              </a:lnSpc>
+              <a:spcBef>
+                <a:spcPts val="500"/>
+              </a:spcBef>
+              <a:buClr>
+                <a:schemeClr val="tx1">
+                  <a:lumMod val="85000"/>
+                  <a:lumOff val="15000"/>
+                </a:schemeClr>
+              </a:buClr>
+              <a:buFont typeface="Garamond" pitchFamily="18" charset="0"/>
+              <a:buChar char="◦"/>
+              <a:defRPr sz="1400" kern="1200">
+                <a:solidFill>
+                  <a:schemeClr val="tx1"/>
+                </a:solidFill>
+                <a:latin typeface="+mn-lt"/>
+                <a:ea typeface="+mn-ea"/>
+                <a:cs typeface="+mn-cs"/>
+              </a:defRPr>
+            </a:lvl8pPr>
+            <a:lvl9pPr marL="2500000" indent="-228600" algn="l" defTabSz="914400" rtl="0" eaLnBrk="1" latinLnBrk="0" hangingPunct="1">
+              <a:lnSpc>
+                <a:spcPct val="100000"/>
+              </a:lnSpc>
+              <a:spcBef>
+                <a:spcPts val="500"/>
+              </a:spcBef>
+              <a:buClr>
+                <a:schemeClr val="tx1">
+                  <a:lumMod val="85000"/>
+                  <a:lumOff val="15000"/>
+                </a:schemeClr>
+              </a:buClr>
+              <a:buFont typeface="Garamond" pitchFamily="18" charset="0"/>
+              <a:buChar char="◦"/>
+              <a:defRPr sz="1400" kern="1200">
+                <a:solidFill>
+                  <a:schemeClr val="tx1"/>
+                </a:solidFill>
+                <a:latin typeface="+mn-lt"/>
+                <a:ea typeface="+mn-ea"/>
+                <a:cs typeface="+mn-cs"/>
+              </a:defRPr>
+            </a:lvl9pPr>
+          </a:lstStyle>
+          <a:p>
+            <a:endParaRPr lang="en-US" dirty="0"/>
+          </a:p>
+        </p:txBody>
+      </p:sp>
+      <p:sp>
+        <p:nvSpPr>
+          <p:cNvPr id="14" name="Content Placeholder 4">
+            <a:extLst>
+              <a:ext uri="{FF2B5EF4-FFF2-40B4-BE49-F238E27FC236}">
+                <a16:creationId xmlns:a16="http://schemas.microsoft.com/office/drawing/2014/main" id="{9AF850D9-62C2-4DC0-FAFD-2D3B0B4994EF}"/>
+              </a:ext>
+            </a:extLst>
+          </p:cNvPr>
+          <p:cNvSpPr txBox="1">
+            <a:spLocks/>
+          </p:cNvSpPr>
+          <p:nvPr/>
+        </p:nvSpPr>
+        <p:spPr>
+          <a:xfrm>
+            <a:off x="7924802" y="2794637"/>
+            <a:ext cx="3219348" cy="3163825"/>
+          </a:xfrm>
+          <a:prstGeom prst="rect">
+            <a:avLst/>
+          </a:prstGeom>
+        </p:spPr>
+        <p:txBody>
+          <a:bodyPr vert="horz" lIns="91440" tIns="45720" rIns="91440" bIns="45720" rtlCol="0">
+            <a:normAutofit/>
+          </a:bodyPr>
+          <a:lstStyle>
+            <a:lvl1pPr marL="182880" indent="-182880" algn="l" defTabSz="914400" rtl="0" eaLnBrk="1" latinLnBrk="0" hangingPunct="1">
+              <a:lnSpc>
+                <a:spcPct val="110000"/>
+              </a:lnSpc>
+              <a:spcBef>
+                <a:spcPts val="900"/>
+              </a:spcBef>
+              <a:spcAft>
+                <a:spcPts val="0"/>
+              </a:spcAft>
+              <a:buClr>
+                <a:schemeClr val="tx1">
+                  <a:lumMod val="85000"/>
+                  <a:lumOff val="15000"/>
+                </a:schemeClr>
+              </a:buClr>
+              <a:buFont typeface="Garamond" pitchFamily="18" charset="0"/>
+              <a:buChar char="◦"/>
+              <a:defRPr sz="1800" kern="1200">
+                <a:solidFill>
+                  <a:schemeClr val="tx1"/>
+                </a:solidFill>
+                <a:latin typeface="+mn-lt"/>
+                <a:ea typeface="+mn-ea"/>
+                <a:cs typeface="+mn-cs"/>
+              </a:defRPr>
+            </a:lvl1pPr>
+            <a:lvl2pPr marL="457200" indent="-182880" algn="l" defTabSz="914400" rtl="0" eaLnBrk="1" latinLnBrk="0" hangingPunct="1">
+              <a:lnSpc>
+                <a:spcPct val="100000"/>
+              </a:lnSpc>
+              <a:spcBef>
+                <a:spcPts val="500"/>
+              </a:spcBef>
+              <a:buClr>
+                <a:schemeClr val="tx1">
+                  <a:lumMod val="85000"/>
+                  <a:lumOff val="15000"/>
+                </a:schemeClr>
+              </a:buClr>
+              <a:buFont typeface="Garamond" pitchFamily="18" charset="0"/>
+              <a:buChar char="◦"/>
+              <a:defRPr sz="1600" kern="1200">
+                <a:solidFill>
+                  <a:schemeClr val="tx1"/>
+                </a:solidFill>
+                <a:latin typeface="+mn-lt"/>
+                <a:ea typeface="+mn-ea"/>
+                <a:cs typeface="+mn-cs"/>
+              </a:defRPr>
+            </a:lvl2pPr>
+            <a:lvl3pPr marL="731520" indent="-182880" algn="l" defTabSz="914400" rtl="0" eaLnBrk="1" latinLnBrk="0" hangingPunct="1">
+              <a:lnSpc>
+                <a:spcPct val="100000"/>
+              </a:lnSpc>
+              <a:spcBef>
+                <a:spcPts val="500"/>
+              </a:spcBef>
+              <a:buClr>
+                <a:schemeClr val="tx1">
+                  <a:lumMod val="85000"/>
+                  <a:lumOff val="15000"/>
+                </a:schemeClr>
+              </a:buClr>
+              <a:buFont typeface="Garamond" pitchFamily="18" charset="0"/>
+              <a:buChar char="◦"/>
+              <a:defRPr sz="1400" kern="1200">
+                <a:solidFill>
+                  <a:schemeClr val="tx1"/>
+                </a:solidFill>
+                <a:latin typeface="+mn-lt"/>
+                <a:ea typeface="+mn-ea"/>
+                <a:cs typeface="+mn-cs"/>
+              </a:defRPr>
+            </a:lvl3pPr>
+            <a:lvl4pPr marL="1005840" indent="-182880" algn="l" defTabSz="914400" rtl="0" eaLnBrk="1" latinLnBrk="0" hangingPunct="1">
+              <a:lnSpc>
+                <a:spcPct val="100000"/>
+              </a:lnSpc>
+              <a:spcBef>
+                <a:spcPts val="500"/>
+              </a:spcBef>
+              <a:buClr>
+                <a:schemeClr val="tx1">
+                  <a:lumMod val="85000"/>
+                  <a:lumOff val="15000"/>
+                </a:schemeClr>
+              </a:buClr>
+              <a:buFont typeface="Garamond" pitchFamily="18" charset="0"/>
+              <a:buChar char="◦"/>
+              <a:defRPr sz="1400" kern="1200">
+                <a:solidFill>
+                  <a:schemeClr val="tx1"/>
+                </a:solidFill>
+                <a:latin typeface="+mn-lt"/>
+                <a:ea typeface="+mn-ea"/>
+                <a:cs typeface="+mn-cs"/>
+              </a:defRPr>
+            </a:lvl4pPr>
+            <a:lvl5pPr marL="1280160" indent="-182880" algn="l" defTabSz="914400" rtl="0" eaLnBrk="1" latinLnBrk="0" hangingPunct="1">
+              <a:lnSpc>
+                <a:spcPct val="100000"/>
+              </a:lnSpc>
+              <a:spcBef>
+                <a:spcPts val="500"/>
+              </a:spcBef>
+              <a:buClr>
+                <a:schemeClr val="tx1">
+                  <a:lumMod val="85000"/>
+                  <a:lumOff val="15000"/>
+                </a:schemeClr>
+              </a:buClr>
+              <a:buFont typeface="Garamond" pitchFamily="18" charset="0"/>
+              <a:buChar char="◦"/>
+              <a:defRPr sz="1400" kern="1200">
+                <a:solidFill>
+                  <a:schemeClr val="tx1"/>
+                </a:solidFill>
+                <a:latin typeface="+mn-lt"/>
+                <a:ea typeface="+mn-ea"/>
+                <a:cs typeface="+mn-cs"/>
+              </a:defRPr>
+            </a:lvl5pPr>
+            <a:lvl6pPr marL="1600000" indent="-228600" algn="l" defTabSz="914400" rtl="0" eaLnBrk="1" latinLnBrk="0" hangingPunct="1">
+              <a:lnSpc>
+                <a:spcPct val="100000"/>
+              </a:lnSpc>
+              <a:spcBef>
+                <a:spcPts val="500"/>
+              </a:spcBef>
+              <a:buClr>
+                <a:schemeClr val="tx1">
+                  <a:lumMod val="85000"/>
+                  <a:lumOff val="15000"/>
+                </a:schemeClr>
+              </a:buClr>
+              <a:buFont typeface="Garamond" pitchFamily="18" charset="0"/>
+              <a:buChar char="◦"/>
+              <a:defRPr sz="1400" kern="1200">
+                <a:solidFill>
+                  <a:schemeClr val="tx1"/>
+                </a:solidFill>
+                <a:latin typeface="+mn-lt"/>
+                <a:ea typeface="+mn-ea"/>
+                <a:cs typeface="+mn-cs"/>
+              </a:defRPr>
+            </a:lvl6pPr>
+            <a:lvl7pPr marL="1900000" indent="-228600" algn="l" defTabSz="914400" rtl="0" eaLnBrk="1" latinLnBrk="0" hangingPunct="1">
+              <a:lnSpc>
+                <a:spcPct val="100000"/>
+              </a:lnSpc>
+              <a:spcBef>
+                <a:spcPts val="500"/>
+              </a:spcBef>
+              <a:buClr>
+                <a:schemeClr val="tx1">
+                  <a:lumMod val="85000"/>
+                  <a:lumOff val="15000"/>
+                </a:schemeClr>
+              </a:buClr>
+              <a:buFont typeface="Garamond" pitchFamily="18" charset="0"/>
+              <a:buChar char="◦"/>
+              <a:defRPr sz="1400" kern="1200">
+                <a:solidFill>
+                  <a:schemeClr val="tx1"/>
+                </a:solidFill>
+                <a:latin typeface="+mn-lt"/>
+                <a:ea typeface="+mn-ea"/>
+                <a:cs typeface="+mn-cs"/>
+              </a:defRPr>
+            </a:lvl7pPr>
+            <a:lvl8pPr marL="2200000" indent="-228600" algn="l" defTabSz="914400" rtl="0" eaLnBrk="1" latinLnBrk="0" hangingPunct="1">
+              <a:lnSpc>
+                <a:spcPct val="100000"/>
+              </a:lnSpc>
+              <a:spcBef>
+                <a:spcPts val="500"/>
+              </a:spcBef>
+              <a:buClr>
+                <a:schemeClr val="tx1">
+                  <a:lumMod val="85000"/>
+                  <a:lumOff val="15000"/>
+                </a:schemeClr>
+              </a:buClr>
+              <a:buFont typeface="Garamond" pitchFamily="18" charset="0"/>
+              <a:buChar char="◦"/>
+              <a:defRPr sz="1400" kern="1200">
+                <a:solidFill>
+                  <a:schemeClr val="tx1"/>
+                </a:solidFill>
+                <a:latin typeface="+mn-lt"/>
+                <a:ea typeface="+mn-ea"/>
+                <a:cs typeface="+mn-cs"/>
+              </a:defRPr>
+            </a:lvl8pPr>
+            <a:lvl9pPr marL="2500000" indent="-228600" algn="l" defTabSz="914400" rtl="0" eaLnBrk="1" latinLnBrk="0" hangingPunct="1">
+              <a:lnSpc>
+                <a:spcPct val="100000"/>
+              </a:lnSpc>
+              <a:spcBef>
+                <a:spcPts val="500"/>
+              </a:spcBef>
+              <a:buClr>
+                <a:schemeClr val="tx1">
+                  <a:lumMod val="85000"/>
+                  <a:lumOff val="15000"/>
+                </a:schemeClr>
+              </a:buClr>
+              <a:buFont typeface="Garamond" pitchFamily="18" charset="0"/>
+              <a:buChar char="◦"/>
+              <a:defRPr sz="1400" kern="1200">
+                <a:solidFill>
+                  <a:schemeClr val="tx1"/>
+                </a:solidFill>
+                <a:latin typeface="+mn-lt"/>
+                <a:ea typeface="+mn-ea"/>
+                <a:cs typeface="+mn-cs"/>
+              </a:defRPr>
+            </a:lvl9pPr>
+          </a:lstStyle>
+          <a:p>
+            <a:r>
+              <a:rPr lang="en-US" dirty="0"/>
+              <a:t>v</a:t>
+            </a:r>
+          </a:p>
+        </p:txBody>
+      </p:sp>
+      <p:sp>
+        <p:nvSpPr>
+          <p:cNvPr id="17" name="Content Placeholder 4">
+            <a:extLst>
+              <a:ext uri="{FF2B5EF4-FFF2-40B4-BE49-F238E27FC236}">
+                <a16:creationId xmlns:a16="http://schemas.microsoft.com/office/drawing/2014/main" id="{E5761393-E549-152D-887C-FEAC30790328}"/>
+              </a:ext>
+            </a:extLst>
+          </p:cNvPr>
+          <p:cNvSpPr txBox="1">
+            <a:spLocks/>
+          </p:cNvSpPr>
+          <p:nvPr/>
+        </p:nvSpPr>
+        <p:spPr>
+          <a:xfrm>
+            <a:off x="4531058" y="2792472"/>
+            <a:ext cx="3219348" cy="3163825"/>
+          </a:xfrm>
+          <a:prstGeom prst="rect">
+            <a:avLst/>
+          </a:prstGeom>
+        </p:spPr>
+        <p:txBody>
+          <a:bodyPr vert="horz" lIns="91440" tIns="45720" rIns="91440" bIns="45720" rtlCol="0">
+            <a:normAutofit/>
+          </a:bodyPr>
+          <a:lstStyle>
+            <a:lvl1pPr marL="182880" indent="-182880" algn="l" defTabSz="914400" rtl="0" eaLnBrk="1" latinLnBrk="0" hangingPunct="1">
+              <a:lnSpc>
+                <a:spcPct val="110000"/>
+              </a:lnSpc>
+              <a:spcBef>
+                <a:spcPts val="900"/>
+              </a:spcBef>
+              <a:spcAft>
+                <a:spcPts val="0"/>
+              </a:spcAft>
+              <a:buClr>
+                <a:schemeClr val="tx1">
+                  <a:lumMod val="85000"/>
+                  <a:lumOff val="15000"/>
+                </a:schemeClr>
+              </a:buClr>
+              <a:buFont typeface="Garamond" pitchFamily="18" charset="0"/>
+              <a:buChar char="◦"/>
+              <a:defRPr sz="1800" kern="1200">
+                <a:solidFill>
+                  <a:schemeClr val="tx1"/>
+                </a:solidFill>
+                <a:latin typeface="+mn-lt"/>
+                <a:ea typeface="+mn-ea"/>
+                <a:cs typeface="+mn-cs"/>
+              </a:defRPr>
+            </a:lvl1pPr>
+            <a:lvl2pPr marL="457200" indent="-182880" algn="l" defTabSz="914400" rtl="0" eaLnBrk="1" latinLnBrk="0" hangingPunct="1">
+              <a:lnSpc>
+                <a:spcPct val="100000"/>
+              </a:lnSpc>
+              <a:spcBef>
+                <a:spcPts val="500"/>
+              </a:spcBef>
+              <a:buClr>
+                <a:schemeClr val="tx1">
+                  <a:lumMod val="85000"/>
+                  <a:lumOff val="15000"/>
+                </a:schemeClr>
+              </a:buClr>
+              <a:buFont typeface="Garamond" pitchFamily="18" charset="0"/>
+              <a:buChar char="◦"/>
+              <a:defRPr sz="1600" kern="1200">
+                <a:solidFill>
+                  <a:schemeClr val="tx1"/>
+                </a:solidFill>
+                <a:latin typeface="+mn-lt"/>
+                <a:ea typeface="+mn-ea"/>
+                <a:cs typeface="+mn-cs"/>
+              </a:defRPr>
+            </a:lvl2pPr>
+            <a:lvl3pPr marL="731520" indent="-182880" algn="l" defTabSz="914400" rtl="0" eaLnBrk="1" latinLnBrk="0" hangingPunct="1">
+              <a:lnSpc>
+                <a:spcPct val="100000"/>
+              </a:lnSpc>
+              <a:spcBef>
+                <a:spcPts val="500"/>
+              </a:spcBef>
+              <a:buClr>
+                <a:schemeClr val="tx1">
+                  <a:lumMod val="85000"/>
+                  <a:lumOff val="15000"/>
+                </a:schemeClr>
+              </a:buClr>
+              <a:buFont typeface="Garamond" pitchFamily="18" charset="0"/>
+              <a:buChar char="◦"/>
+              <a:defRPr sz="1400" kern="1200">
+                <a:solidFill>
+                  <a:schemeClr val="tx1"/>
+                </a:solidFill>
+                <a:latin typeface="+mn-lt"/>
+                <a:ea typeface="+mn-ea"/>
+                <a:cs typeface="+mn-cs"/>
+              </a:defRPr>
+            </a:lvl3pPr>
+            <a:lvl4pPr marL="1005840" indent="-182880" algn="l" defTabSz="914400" rtl="0" eaLnBrk="1" latinLnBrk="0" hangingPunct="1">
+              <a:lnSpc>
+                <a:spcPct val="100000"/>
+              </a:lnSpc>
+              <a:spcBef>
+                <a:spcPts val="500"/>
+              </a:spcBef>
+              <a:buClr>
+                <a:schemeClr val="tx1">
+                  <a:lumMod val="85000"/>
+                  <a:lumOff val="15000"/>
+                </a:schemeClr>
+              </a:buClr>
+              <a:buFont typeface="Garamond" pitchFamily="18" charset="0"/>
+              <a:buChar char="◦"/>
+              <a:defRPr sz="1400" kern="1200">
+                <a:solidFill>
+                  <a:schemeClr val="tx1"/>
+                </a:solidFill>
+                <a:latin typeface="+mn-lt"/>
+                <a:ea typeface="+mn-ea"/>
+                <a:cs typeface="+mn-cs"/>
+              </a:defRPr>
+            </a:lvl4pPr>
+            <a:lvl5pPr marL="1280160" indent="-182880" algn="l" defTabSz="914400" rtl="0" eaLnBrk="1" latinLnBrk="0" hangingPunct="1">
+              <a:lnSpc>
+                <a:spcPct val="100000"/>
+              </a:lnSpc>
+              <a:spcBef>
+                <a:spcPts val="500"/>
+              </a:spcBef>
+              <a:buClr>
+                <a:schemeClr val="tx1">
+                  <a:lumMod val="85000"/>
+                  <a:lumOff val="15000"/>
+                </a:schemeClr>
+              </a:buClr>
+              <a:buFont typeface="Garamond" pitchFamily="18" charset="0"/>
+              <a:buChar char="◦"/>
+              <a:defRPr sz="1400" kern="1200">
+                <a:solidFill>
+                  <a:schemeClr val="tx1"/>
+                </a:solidFill>
+                <a:latin typeface="+mn-lt"/>
+                <a:ea typeface="+mn-ea"/>
+                <a:cs typeface="+mn-cs"/>
+              </a:defRPr>
+            </a:lvl5pPr>
+            <a:lvl6pPr marL="1600000" indent="-228600" algn="l" defTabSz="914400" rtl="0" eaLnBrk="1" latinLnBrk="0" hangingPunct="1">
+              <a:lnSpc>
+                <a:spcPct val="100000"/>
+              </a:lnSpc>
+              <a:spcBef>
+                <a:spcPts val="500"/>
+              </a:spcBef>
+              <a:buClr>
+                <a:schemeClr val="tx1">
+                  <a:lumMod val="85000"/>
+                  <a:lumOff val="15000"/>
+                </a:schemeClr>
+              </a:buClr>
+              <a:buFont typeface="Garamond" pitchFamily="18" charset="0"/>
+              <a:buChar char="◦"/>
+              <a:defRPr sz="1400" kern="1200">
+                <a:solidFill>
+                  <a:schemeClr val="tx1"/>
+                </a:solidFill>
+                <a:latin typeface="+mn-lt"/>
+                <a:ea typeface="+mn-ea"/>
+                <a:cs typeface="+mn-cs"/>
+              </a:defRPr>
+            </a:lvl6pPr>
+            <a:lvl7pPr marL="1900000" indent="-228600" algn="l" defTabSz="914400" rtl="0" eaLnBrk="1" latinLnBrk="0" hangingPunct="1">
+              <a:lnSpc>
+                <a:spcPct val="100000"/>
+              </a:lnSpc>
+              <a:spcBef>
+                <a:spcPts val="500"/>
+              </a:spcBef>
+              <a:buClr>
+                <a:schemeClr val="tx1">
+                  <a:lumMod val="85000"/>
+                  <a:lumOff val="15000"/>
+                </a:schemeClr>
+              </a:buClr>
+              <a:buFont typeface="Garamond" pitchFamily="18" charset="0"/>
+              <a:buChar char="◦"/>
+              <a:defRPr sz="1400" kern="1200">
+                <a:solidFill>
+                  <a:schemeClr val="tx1"/>
+                </a:solidFill>
+                <a:latin typeface="+mn-lt"/>
+                <a:ea typeface="+mn-ea"/>
+                <a:cs typeface="+mn-cs"/>
+              </a:defRPr>
+            </a:lvl7pPr>
+            <a:lvl8pPr marL="2200000" indent="-228600" algn="l" defTabSz="914400" rtl="0" eaLnBrk="1" latinLnBrk="0" hangingPunct="1">
+              <a:lnSpc>
+                <a:spcPct val="100000"/>
+              </a:lnSpc>
+              <a:spcBef>
+                <a:spcPts val="500"/>
+              </a:spcBef>
+              <a:buClr>
+                <a:schemeClr val="tx1">
+                  <a:lumMod val="85000"/>
+                  <a:lumOff val="15000"/>
+                </a:schemeClr>
+              </a:buClr>
+              <a:buFont typeface="Garamond" pitchFamily="18" charset="0"/>
+              <a:buChar char="◦"/>
+              <a:defRPr sz="1400" kern="1200">
+                <a:solidFill>
+                  <a:schemeClr val="tx1"/>
+                </a:solidFill>
+                <a:latin typeface="+mn-lt"/>
+                <a:ea typeface="+mn-ea"/>
+                <a:cs typeface="+mn-cs"/>
+              </a:defRPr>
+            </a:lvl8pPr>
+            <a:lvl9pPr marL="2500000" indent="-228600" algn="l" defTabSz="914400" rtl="0" eaLnBrk="1" latinLnBrk="0" hangingPunct="1">
+              <a:lnSpc>
+                <a:spcPct val="100000"/>
+              </a:lnSpc>
+              <a:spcBef>
+                <a:spcPts val="500"/>
+              </a:spcBef>
+              <a:buClr>
+                <a:schemeClr val="tx1">
+                  <a:lumMod val="85000"/>
+                  <a:lumOff val="15000"/>
+                </a:schemeClr>
+              </a:buClr>
+              <a:buFont typeface="Garamond" pitchFamily="18" charset="0"/>
+              <a:buChar char="◦"/>
+              <a:defRPr sz="1400" kern="1200">
+                <a:solidFill>
+                  <a:schemeClr val="tx1"/>
+                </a:solidFill>
+                <a:latin typeface="+mn-lt"/>
+                <a:ea typeface="+mn-ea"/>
+                <a:cs typeface="+mn-cs"/>
+              </a:defRPr>
+            </a:lvl9pPr>
+          </a:lstStyle>
+          <a:p>
+            <a:r>
+              <a:rPr lang="en-US" dirty="0"/>
+              <a:t>v</a:t>
+            </a:r>
+          </a:p>
+        </p:txBody>
+      </p:sp>
+      <p:sp>
+        <p:nvSpPr>
+          <p:cNvPr id="18" name="Text Placeholder 3">
+            <a:extLst>
+              <a:ext uri="{FF2B5EF4-FFF2-40B4-BE49-F238E27FC236}">
+                <a16:creationId xmlns:a16="http://schemas.microsoft.com/office/drawing/2014/main" id="{FCE161C2-F1C4-DCDF-530D-82ED14702499}"/>
+              </a:ext>
+            </a:extLst>
+          </p:cNvPr>
+          <p:cNvSpPr txBox="1">
+            <a:spLocks/>
+          </p:cNvSpPr>
+          <p:nvPr/>
+        </p:nvSpPr>
+        <p:spPr>
+          <a:xfrm>
+            <a:off x="4683458" y="2107492"/>
+            <a:ext cx="3219348" cy="640080"/>
+          </a:xfrm>
+          <a:prstGeom prst="rect">
+            <a:avLst/>
+          </a:prstGeom>
+        </p:spPr>
+        <p:txBody>
+          <a:bodyPr vert="horz" lIns="91440" tIns="45720" rIns="91440" bIns="45720" rtlCol="0" anchor="ctr">
+            <a:normAutofit/>
+          </a:bodyPr>
+          <a:lstStyle>
+            <a:lvl1pPr marL="0" indent="0" algn="l" defTabSz="914400" rtl="0" eaLnBrk="1" latinLnBrk="0" hangingPunct="1">
+              <a:lnSpc>
+                <a:spcPct val="110000"/>
+              </a:lnSpc>
+              <a:spcBef>
+                <a:spcPts val="0"/>
+              </a:spcBef>
+              <a:spcAft>
+                <a:spcPts val="0"/>
+              </a:spcAft>
+              <a:buClr>
+                <a:schemeClr val="tx1">
+                  <a:lumMod val="85000"/>
+                  <a:lumOff val="15000"/>
+                </a:schemeClr>
+              </a:buClr>
+              <a:buFont typeface="Garamond" pitchFamily="18" charset="0"/>
+              <a:buNone/>
+              <a:defRPr sz="1900" b="1" i="0" kern="1200">
+                <a:solidFill>
+                  <a:schemeClr val="tx1"/>
+                </a:solidFill>
+                <a:latin typeface="+mn-lt"/>
+                <a:ea typeface="+mn-ea"/>
+                <a:cs typeface="+mn-cs"/>
+              </a:defRPr>
+            </a:lvl1pPr>
+            <a:lvl2pPr marL="457200" indent="0" algn="l" defTabSz="914400" rtl="0" eaLnBrk="1" latinLnBrk="0" hangingPunct="1">
+              <a:lnSpc>
+                <a:spcPct val="100000"/>
+              </a:lnSpc>
+              <a:spcBef>
+                <a:spcPts val="500"/>
+              </a:spcBef>
+              <a:buClr>
+                <a:schemeClr val="tx1">
+                  <a:lumMod val="85000"/>
+                  <a:lumOff val="15000"/>
+                </a:schemeClr>
+              </a:buClr>
+              <a:buFont typeface="Garamond" pitchFamily="18" charset="0"/>
+              <a:buNone/>
+              <a:defRPr sz="1800" b="1" kern="1200">
+                <a:solidFill>
+                  <a:schemeClr val="tx1"/>
+                </a:solidFill>
+                <a:latin typeface="+mn-lt"/>
+                <a:ea typeface="+mn-ea"/>
+                <a:cs typeface="+mn-cs"/>
+              </a:defRPr>
+            </a:lvl2pPr>
+            <a:lvl3pPr marL="914400" indent="0" algn="l" defTabSz="914400" rtl="0" eaLnBrk="1" latinLnBrk="0" hangingPunct="1">
+              <a:lnSpc>
+                <a:spcPct val="100000"/>
+              </a:lnSpc>
+              <a:spcBef>
+                <a:spcPts val="500"/>
+              </a:spcBef>
+              <a:buClr>
+                <a:schemeClr val="tx1">
+                  <a:lumMod val="85000"/>
+                  <a:lumOff val="15000"/>
+                </a:schemeClr>
+              </a:buClr>
+              <a:buFont typeface="Garamond" pitchFamily="18" charset="0"/>
+              <a:buNone/>
+              <a:defRPr sz="1800" b="1" kern="1200">
+                <a:solidFill>
+                  <a:schemeClr val="tx1"/>
+                </a:solidFill>
+                <a:latin typeface="+mn-lt"/>
+                <a:ea typeface="+mn-ea"/>
+                <a:cs typeface="+mn-cs"/>
+              </a:defRPr>
+            </a:lvl3pPr>
+            <a:lvl4pPr marL="1371600" indent="0" algn="l" defTabSz="914400" rtl="0" eaLnBrk="1" latinLnBrk="0" hangingPunct="1">
+              <a:lnSpc>
+                <a:spcPct val="100000"/>
+              </a:lnSpc>
+              <a:spcBef>
+                <a:spcPts val="500"/>
+              </a:spcBef>
+              <a:buClr>
+                <a:schemeClr val="tx1">
+                  <a:lumMod val="85000"/>
+                  <a:lumOff val="15000"/>
+                </a:schemeClr>
+              </a:buClr>
+              <a:buFont typeface="Garamond" pitchFamily="18" charset="0"/>
+              <a:buNone/>
+              <a:defRPr sz="1600" b="1" kern="1200">
+                <a:solidFill>
+                  <a:schemeClr val="tx1"/>
+                </a:solidFill>
+                <a:latin typeface="+mn-lt"/>
+                <a:ea typeface="+mn-ea"/>
+                <a:cs typeface="+mn-cs"/>
+              </a:defRPr>
+            </a:lvl4pPr>
+            <a:lvl5pPr marL="1828800" indent="0" algn="l" defTabSz="914400" rtl="0" eaLnBrk="1" latinLnBrk="0" hangingPunct="1">
+              <a:lnSpc>
+                <a:spcPct val="100000"/>
+              </a:lnSpc>
+              <a:spcBef>
+                <a:spcPts val="500"/>
+              </a:spcBef>
+              <a:buClr>
+                <a:schemeClr val="tx1">
+                  <a:lumMod val="85000"/>
+                  <a:lumOff val="15000"/>
+                </a:schemeClr>
+              </a:buClr>
+              <a:buFont typeface="Garamond" pitchFamily="18" charset="0"/>
+              <a:buNone/>
+              <a:defRPr sz="1600" b="1" kern="1200">
+                <a:solidFill>
+                  <a:schemeClr val="tx1"/>
+                </a:solidFill>
+                <a:latin typeface="+mn-lt"/>
+                <a:ea typeface="+mn-ea"/>
+                <a:cs typeface="+mn-cs"/>
+              </a:defRPr>
+            </a:lvl5pPr>
+            <a:lvl6pPr marL="2286000" indent="0" algn="l" defTabSz="914400" rtl="0" eaLnBrk="1" latinLnBrk="0" hangingPunct="1">
+              <a:lnSpc>
+                <a:spcPct val="100000"/>
+              </a:lnSpc>
+              <a:spcBef>
+                <a:spcPts val="500"/>
+              </a:spcBef>
+              <a:buClr>
+                <a:schemeClr val="tx1">
+                  <a:lumMod val="85000"/>
+                  <a:lumOff val="15000"/>
+                </a:schemeClr>
+              </a:buClr>
+              <a:buFont typeface="Garamond" pitchFamily="18" charset="0"/>
+              <a:buNone/>
+              <a:defRPr sz="1600" b="1" kern="1200">
+                <a:solidFill>
+                  <a:schemeClr val="tx1"/>
+                </a:solidFill>
+                <a:latin typeface="+mn-lt"/>
+                <a:ea typeface="+mn-ea"/>
+                <a:cs typeface="+mn-cs"/>
+              </a:defRPr>
+            </a:lvl6pPr>
+            <a:lvl7pPr marL="2743200" indent="0" algn="l" defTabSz="914400" rtl="0" eaLnBrk="1" latinLnBrk="0" hangingPunct="1">
+              <a:lnSpc>
+                <a:spcPct val="100000"/>
+              </a:lnSpc>
+              <a:spcBef>
+                <a:spcPts val="500"/>
+              </a:spcBef>
+              <a:buClr>
+                <a:schemeClr val="tx1">
+                  <a:lumMod val="85000"/>
+                  <a:lumOff val="15000"/>
+                </a:schemeClr>
+              </a:buClr>
+              <a:buFont typeface="Garamond" pitchFamily="18" charset="0"/>
+              <a:buNone/>
+              <a:defRPr sz="1600" b="1" kern="1200">
+                <a:solidFill>
+                  <a:schemeClr val="tx1"/>
+                </a:solidFill>
+                <a:latin typeface="+mn-lt"/>
+                <a:ea typeface="+mn-ea"/>
+                <a:cs typeface="+mn-cs"/>
+              </a:defRPr>
+            </a:lvl7pPr>
+            <a:lvl8pPr marL="3200400" indent="0" algn="l" defTabSz="914400" rtl="0" eaLnBrk="1" latinLnBrk="0" hangingPunct="1">
+              <a:lnSpc>
+                <a:spcPct val="100000"/>
+              </a:lnSpc>
+              <a:spcBef>
+                <a:spcPts val="500"/>
+              </a:spcBef>
+              <a:buClr>
+                <a:schemeClr val="tx1">
+                  <a:lumMod val="85000"/>
+                  <a:lumOff val="15000"/>
+                </a:schemeClr>
+              </a:buClr>
+              <a:buFont typeface="Garamond" pitchFamily="18" charset="0"/>
+              <a:buNone/>
+              <a:defRPr sz="1600" b="1" kern="1200">
+                <a:solidFill>
+                  <a:schemeClr val="tx1"/>
+                </a:solidFill>
+                <a:latin typeface="+mn-lt"/>
+                <a:ea typeface="+mn-ea"/>
+                <a:cs typeface="+mn-cs"/>
+              </a:defRPr>
+            </a:lvl8pPr>
+            <a:lvl9pPr marL="3657600" indent="0" algn="l" defTabSz="914400" rtl="0" eaLnBrk="1" latinLnBrk="0" hangingPunct="1">
+              <a:lnSpc>
+                <a:spcPct val="100000"/>
+              </a:lnSpc>
+              <a:spcBef>
+                <a:spcPts val="500"/>
+              </a:spcBef>
+              <a:buClr>
+                <a:schemeClr val="tx1">
+                  <a:lumMod val="85000"/>
+                  <a:lumOff val="15000"/>
+                </a:schemeClr>
+              </a:buClr>
+              <a:buFont typeface="Garamond" pitchFamily="18" charset="0"/>
+              <a:buNone/>
+              <a:defRPr sz="1600" b="1" kern="1200">
+                <a:solidFill>
+                  <a:schemeClr val="tx1"/>
+                </a:solidFill>
+                <a:latin typeface="+mn-lt"/>
+                <a:ea typeface="+mn-ea"/>
+                <a:cs typeface="+mn-cs"/>
+              </a:defRPr>
+            </a:lvl9pPr>
+          </a:lstStyle>
+          <a:p>
+            <a:r>
+              <a:rPr lang="en-US" dirty="0"/>
+              <a:t>Functional requirements</a:t>
+            </a:r>
+          </a:p>
+        </p:txBody>
+      </p:sp>
+      <p:sp>
+        <p:nvSpPr>
+          <p:cNvPr id="19" name="Text Placeholder 3">
+            <a:extLst>
+              <a:ext uri="{FF2B5EF4-FFF2-40B4-BE49-F238E27FC236}">
+                <a16:creationId xmlns:a16="http://schemas.microsoft.com/office/drawing/2014/main" id="{DFD4C4D4-F1B3-8216-287C-74814B3858F8}"/>
+              </a:ext>
+            </a:extLst>
+          </p:cNvPr>
+          <p:cNvSpPr txBox="1">
+            <a:spLocks/>
+          </p:cNvSpPr>
+          <p:nvPr/>
+        </p:nvSpPr>
+        <p:spPr>
+          <a:xfrm>
+            <a:off x="8270359" y="2152392"/>
+            <a:ext cx="3219348" cy="640080"/>
+          </a:xfrm>
+          <a:prstGeom prst="rect">
+            <a:avLst/>
+          </a:prstGeom>
+        </p:spPr>
+        <p:txBody>
+          <a:bodyPr vert="horz" lIns="91440" tIns="45720" rIns="91440" bIns="45720" rtlCol="0" anchor="ctr">
+            <a:normAutofit fontScale="92500" lnSpcReduction="10000"/>
+          </a:bodyPr>
+          <a:lstStyle>
+            <a:lvl1pPr marL="0" indent="0" algn="l" defTabSz="914400" rtl="0" eaLnBrk="1" latinLnBrk="0" hangingPunct="1">
+              <a:lnSpc>
+                <a:spcPct val="110000"/>
+              </a:lnSpc>
+              <a:spcBef>
+                <a:spcPts val="0"/>
+              </a:spcBef>
+              <a:spcAft>
+                <a:spcPts val="0"/>
+              </a:spcAft>
+              <a:buClr>
+                <a:schemeClr val="tx1">
+                  <a:lumMod val="85000"/>
+                  <a:lumOff val="15000"/>
+                </a:schemeClr>
+              </a:buClr>
+              <a:buFont typeface="Garamond" pitchFamily="18" charset="0"/>
+              <a:buNone/>
+              <a:defRPr sz="1900" b="1" i="0" kern="1200">
+                <a:solidFill>
+                  <a:schemeClr val="tx1"/>
+                </a:solidFill>
+                <a:latin typeface="+mn-lt"/>
+                <a:ea typeface="+mn-ea"/>
+                <a:cs typeface="+mn-cs"/>
+              </a:defRPr>
+            </a:lvl1pPr>
+            <a:lvl2pPr marL="457200" indent="0" algn="l" defTabSz="914400" rtl="0" eaLnBrk="1" latinLnBrk="0" hangingPunct="1">
+              <a:lnSpc>
+                <a:spcPct val="100000"/>
+              </a:lnSpc>
+              <a:spcBef>
+                <a:spcPts val="500"/>
+              </a:spcBef>
+              <a:buClr>
+                <a:schemeClr val="tx1">
+                  <a:lumMod val="85000"/>
+                  <a:lumOff val="15000"/>
+                </a:schemeClr>
+              </a:buClr>
+              <a:buFont typeface="Garamond" pitchFamily="18" charset="0"/>
+              <a:buNone/>
+              <a:defRPr sz="1800" b="1" kern="1200">
+                <a:solidFill>
+                  <a:schemeClr val="tx1"/>
+                </a:solidFill>
+                <a:latin typeface="+mn-lt"/>
+                <a:ea typeface="+mn-ea"/>
+                <a:cs typeface="+mn-cs"/>
+              </a:defRPr>
+            </a:lvl2pPr>
+            <a:lvl3pPr marL="914400" indent="0" algn="l" defTabSz="914400" rtl="0" eaLnBrk="1" latinLnBrk="0" hangingPunct="1">
+              <a:lnSpc>
+                <a:spcPct val="100000"/>
+              </a:lnSpc>
+              <a:spcBef>
+                <a:spcPts val="500"/>
+              </a:spcBef>
+              <a:buClr>
+                <a:schemeClr val="tx1">
+                  <a:lumMod val="85000"/>
+                  <a:lumOff val="15000"/>
+                </a:schemeClr>
+              </a:buClr>
+              <a:buFont typeface="Garamond" pitchFamily="18" charset="0"/>
+              <a:buNone/>
+              <a:defRPr sz="1800" b="1" kern="1200">
+                <a:solidFill>
+                  <a:schemeClr val="tx1"/>
+                </a:solidFill>
+                <a:latin typeface="+mn-lt"/>
+                <a:ea typeface="+mn-ea"/>
+                <a:cs typeface="+mn-cs"/>
+              </a:defRPr>
+            </a:lvl3pPr>
+            <a:lvl4pPr marL="1371600" indent="0" algn="l" defTabSz="914400" rtl="0" eaLnBrk="1" latinLnBrk="0" hangingPunct="1">
+              <a:lnSpc>
+                <a:spcPct val="100000"/>
+              </a:lnSpc>
+              <a:spcBef>
+                <a:spcPts val="500"/>
+              </a:spcBef>
+              <a:buClr>
+                <a:schemeClr val="tx1">
+                  <a:lumMod val="85000"/>
+                  <a:lumOff val="15000"/>
+                </a:schemeClr>
+              </a:buClr>
+              <a:buFont typeface="Garamond" pitchFamily="18" charset="0"/>
+              <a:buNone/>
+              <a:defRPr sz="1600" b="1" kern="1200">
+                <a:solidFill>
+                  <a:schemeClr val="tx1"/>
+                </a:solidFill>
+                <a:latin typeface="+mn-lt"/>
+                <a:ea typeface="+mn-ea"/>
+                <a:cs typeface="+mn-cs"/>
+              </a:defRPr>
+            </a:lvl4pPr>
+            <a:lvl5pPr marL="1828800" indent="0" algn="l" defTabSz="914400" rtl="0" eaLnBrk="1" latinLnBrk="0" hangingPunct="1">
+              <a:lnSpc>
+                <a:spcPct val="100000"/>
+              </a:lnSpc>
+              <a:spcBef>
+                <a:spcPts val="500"/>
+              </a:spcBef>
+              <a:buClr>
+                <a:schemeClr val="tx1">
+                  <a:lumMod val="85000"/>
+                  <a:lumOff val="15000"/>
+                </a:schemeClr>
+              </a:buClr>
+              <a:buFont typeface="Garamond" pitchFamily="18" charset="0"/>
+              <a:buNone/>
+              <a:defRPr sz="1600" b="1" kern="1200">
+                <a:solidFill>
+                  <a:schemeClr val="tx1"/>
+                </a:solidFill>
+                <a:latin typeface="+mn-lt"/>
+                <a:ea typeface="+mn-ea"/>
+                <a:cs typeface="+mn-cs"/>
+              </a:defRPr>
+            </a:lvl5pPr>
+            <a:lvl6pPr marL="2286000" indent="0" algn="l" defTabSz="914400" rtl="0" eaLnBrk="1" latinLnBrk="0" hangingPunct="1">
+              <a:lnSpc>
+                <a:spcPct val="100000"/>
+              </a:lnSpc>
+              <a:spcBef>
+                <a:spcPts val="500"/>
+              </a:spcBef>
+              <a:buClr>
+                <a:schemeClr val="tx1">
+                  <a:lumMod val="85000"/>
+                  <a:lumOff val="15000"/>
+                </a:schemeClr>
+              </a:buClr>
+              <a:buFont typeface="Garamond" pitchFamily="18" charset="0"/>
+              <a:buNone/>
+              <a:defRPr sz="1600" b="1" kern="1200">
+                <a:solidFill>
+                  <a:schemeClr val="tx1"/>
+                </a:solidFill>
+                <a:latin typeface="+mn-lt"/>
+                <a:ea typeface="+mn-ea"/>
+                <a:cs typeface="+mn-cs"/>
+              </a:defRPr>
+            </a:lvl6pPr>
+            <a:lvl7pPr marL="2743200" indent="0" algn="l" defTabSz="914400" rtl="0" eaLnBrk="1" latinLnBrk="0" hangingPunct="1">
+              <a:lnSpc>
+                <a:spcPct val="100000"/>
+              </a:lnSpc>
+              <a:spcBef>
+                <a:spcPts val="500"/>
+              </a:spcBef>
+              <a:buClr>
+                <a:schemeClr val="tx1">
+                  <a:lumMod val="85000"/>
+                  <a:lumOff val="15000"/>
+                </a:schemeClr>
+              </a:buClr>
+              <a:buFont typeface="Garamond" pitchFamily="18" charset="0"/>
+              <a:buNone/>
+              <a:defRPr sz="1600" b="1" kern="1200">
+                <a:solidFill>
+                  <a:schemeClr val="tx1"/>
+                </a:solidFill>
+                <a:latin typeface="+mn-lt"/>
+                <a:ea typeface="+mn-ea"/>
+                <a:cs typeface="+mn-cs"/>
+              </a:defRPr>
+            </a:lvl7pPr>
+            <a:lvl8pPr marL="3200400" indent="0" algn="l" defTabSz="914400" rtl="0" eaLnBrk="1" latinLnBrk="0" hangingPunct="1">
+              <a:lnSpc>
+                <a:spcPct val="100000"/>
+              </a:lnSpc>
+              <a:spcBef>
+                <a:spcPts val="500"/>
+              </a:spcBef>
+              <a:buClr>
+                <a:schemeClr val="tx1">
+                  <a:lumMod val="85000"/>
+                  <a:lumOff val="15000"/>
+                </a:schemeClr>
+              </a:buClr>
+              <a:buFont typeface="Garamond" pitchFamily="18" charset="0"/>
+              <a:buNone/>
+              <a:defRPr sz="1600" b="1" kern="1200">
+                <a:solidFill>
+                  <a:schemeClr val="tx1"/>
+                </a:solidFill>
+                <a:latin typeface="+mn-lt"/>
+                <a:ea typeface="+mn-ea"/>
+                <a:cs typeface="+mn-cs"/>
+              </a:defRPr>
+            </a:lvl8pPr>
+            <a:lvl9pPr marL="3657600" indent="0" algn="l" defTabSz="914400" rtl="0" eaLnBrk="1" latinLnBrk="0" hangingPunct="1">
+              <a:lnSpc>
+                <a:spcPct val="100000"/>
+              </a:lnSpc>
+              <a:spcBef>
+                <a:spcPts val="500"/>
+              </a:spcBef>
+              <a:buClr>
+                <a:schemeClr val="tx1">
+                  <a:lumMod val="85000"/>
+                  <a:lumOff val="15000"/>
+                </a:schemeClr>
+              </a:buClr>
+              <a:buFont typeface="Garamond" pitchFamily="18" charset="0"/>
+              <a:buNone/>
+              <a:defRPr sz="1600" b="1" kern="1200">
+                <a:solidFill>
+                  <a:schemeClr val="tx1"/>
+                </a:solidFill>
+                <a:latin typeface="+mn-lt"/>
+                <a:ea typeface="+mn-ea"/>
+                <a:cs typeface="+mn-cs"/>
+              </a:defRPr>
+            </a:lvl9pPr>
+          </a:lstStyle>
+          <a:p>
+            <a:r>
+              <a:rPr lang="en-US" dirty="0"/>
+              <a:t>Non-functional requirements</a:t>
+            </a:r>
           </a:p>
         </p:txBody>
       </p:sp>
@@ -5288,7 +7229,9 @@
           <a:lstStyle/>
           <a:p>
             <a:r>
-              <a:rPr lang="en-US" dirty="0"/>
+              <a:rPr lang="en-US" dirty="0">
+                <a:latin typeface="Algerian" panose="04020705040A02060702" pitchFamily="82" charset="0"/>
+              </a:rPr>
               <a:t>Technology used</a:t>
             </a:r>
           </a:p>
@@ -5315,6 +7258,67 @@
           <a:bodyPr/>
           <a:lstStyle/>
           <a:p>
+            <a:pPr marL="0" indent="0">
+              <a:buNone/>
+            </a:pPr>
+            <a:r>
+              <a:rPr lang="en-US" sz="2000" dirty="0"/>
+              <a:t>Languages and technology used:</a:t>
+            </a:r>
+          </a:p>
+          <a:p>
+            <a:pPr marL="342900" indent="-342900">
+              <a:buFont typeface="+mj-lt"/>
+              <a:buAutoNum type="arabicPeriod"/>
+            </a:pPr>
+            <a:r>
+              <a:rPr lang="en-US" sz="2000" dirty="0"/>
+              <a:t>HTML</a:t>
+            </a:r>
+          </a:p>
+          <a:p>
+            <a:pPr marL="342900" indent="-342900">
+              <a:buFont typeface="+mj-lt"/>
+              <a:buAutoNum type="arabicPeriod"/>
+            </a:pPr>
+            <a:r>
+              <a:rPr lang="en-US" sz="2000" dirty="0"/>
+              <a:t>CSS</a:t>
+            </a:r>
+          </a:p>
+          <a:p>
+            <a:pPr marL="342900" indent="-342900">
+              <a:buFont typeface="+mj-lt"/>
+              <a:buAutoNum type="arabicPeriod"/>
+            </a:pPr>
+            <a:r>
+              <a:rPr lang="en-US" sz="2000" dirty="0" err="1"/>
+              <a:t>Javascript</a:t>
+            </a:r>
+            <a:endParaRPr lang="en-US" sz="2000" dirty="0"/>
+          </a:p>
+          <a:p>
+            <a:pPr marL="342900" indent="-342900">
+              <a:buFont typeface="+mj-lt"/>
+              <a:buAutoNum type="arabicPeriod"/>
+            </a:pPr>
+            <a:r>
+              <a:rPr lang="en-US" sz="2000" dirty="0"/>
+              <a:t>Django</a:t>
+            </a:r>
+          </a:p>
+          <a:p>
+            <a:pPr marL="342900" indent="-342900">
+              <a:buFont typeface="+mj-lt"/>
+              <a:buAutoNum type="arabicPeriod"/>
+            </a:pPr>
+            <a:endParaRPr lang="en-US" dirty="0"/>
+          </a:p>
+          <a:p>
+            <a:pPr marL="342900" indent="-342900">
+              <a:buFont typeface="+mj-lt"/>
+              <a:buAutoNum type="arabicPeriod"/>
+            </a:pPr>
             <a:endParaRPr lang="en-US" dirty="0"/>
           </a:p>
         </p:txBody>
@@ -5351,6 +7355,24 @@
       </p:grpSpPr>
       <p:sp>
         <p:nvSpPr>
+          <p:cNvPr id="4" name="Picture Placeholder 3">
+            <a:extLst>
+              <a:ext uri="{FF2B5EF4-FFF2-40B4-BE49-F238E27FC236}">
+                <a16:creationId xmlns:a16="http://schemas.microsoft.com/office/drawing/2014/main" id="{67C59745-765F-7D5A-DED8-FCF4CBBCD9A7}"/>
+              </a:ext>
+            </a:extLst>
+          </p:cNvPr>
+          <p:cNvSpPr>
+            <a:spLocks noGrp="1"/>
+          </p:cNvSpPr>
+          <p:nvPr>
+            <p:ph type="pic" idx="1"/>
+          </p:nvPr>
+        </p:nvSpPr>
+        <p:spPr/>
+      </p:sp>
+      <p:sp>
+        <p:nvSpPr>
           <p:cNvPr id="2" name="Title 1">
             <a:extLst>
               <a:ext uri="{FF2B5EF4-FFF2-40B4-BE49-F238E27FC236}">
@@ -5371,7 +7393,9 @@
           <a:lstStyle/>
           <a:p>
             <a:r>
-              <a:rPr lang="en-US"/>
+              <a:rPr lang="en-US" dirty="0">
+                <a:latin typeface="Algerian" panose="04020705040A02060702" pitchFamily="82" charset="0"/>
+              </a:rPr>
               <a:t>Database Designing</a:t>
             </a:r>
           </a:p>
@@ -5379,10 +7403,10 @@
       </p:sp>
       <p:sp>
         <p:nvSpPr>
-          <p:cNvPr id="3" name="Content Placeholder 2">
+          <p:cNvPr id="5" name="Text Placeholder 4">
             <a:extLst>
               <a:ext uri="{FF2B5EF4-FFF2-40B4-BE49-F238E27FC236}">
-                <a16:creationId xmlns:a16="http://schemas.microsoft.com/office/drawing/2014/main" id="{EA9DE1E7-BB80-D501-6674-87DBFD81EF91}"/>
+                <a16:creationId xmlns:a16="http://schemas.microsoft.com/office/drawing/2014/main" id="{11C4F4D3-EC3E-8F33-2AE6-8FC25AC84ACA}"/>
               </a:ext>
             </a:extLst>
           </p:cNvPr>
@@ -5390,7 +7414,7 @@
             <a:spLocks noGrp="1"/>
           </p:cNvSpPr>
           <p:nvPr>
-            <p:ph idx="1"/>
+            <p:ph type="body" sz="half" idx="2"/>
           </p:nvPr>
         </p:nvSpPr>
         <p:spPr/>
@@ -5398,7 +7422,7 @@
           <a:bodyPr/>
           <a:lstStyle/>
           <a:p>
-            <a:endParaRPr lang="en-US"/>
+            <a:endParaRPr lang="en-US" dirty="0"/>
           </a:p>
         </p:txBody>
       </p:sp>
@@ -6030,15 +8054,6 @@
 </file>
 
 <file path=customXml/item1.xml><?xml version="1.0" encoding="utf-8"?>
-<?mso-contentType ?>
-<FormTemplates xmlns="http://schemas.microsoft.com/sharepoint/v3/contenttype/forms">
-  <Display>DocumentLibraryForm</Display>
-  <Edit>DocumentLibraryForm</Edit>
-  <New>DocumentLibraryForm</New>
-</FormTemplates>
-</file>
-
-<file path=customXml/item2.xml><?xml version="1.0" encoding="utf-8"?>
 <ct:contentTypeSchema xmlns:ct="http://schemas.microsoft.com/office/2006/metadata/contentType" xmlns:ma="http://schemas.microsoft.com/office/2006/metadata/properties/metaAttributes" ct:_="" ma:_="" ma:contentTypeName="Document" ma:contentTypeID="0x01010079F111ED35F8CC479449609E8A0923A6" ma:contentTypeVersion="12" ma:contentTypeDescription="Create a new document." ma:contentTypeScope="" ma:versionID="a410dd7f93c95333ffa1b60ed6adedd1">
   <xsd:schema xmlns:xsd="http://www.w3.org/2001/XMLSchema" xmlns:xs="http://www.w3.org/2001/XMLSchema" xmlns:p="http://schemas.microsoft.com/office/2006/metadata/properties" xmlns:ns2="71af3243-3dd4-4a8d-8c0d-dd76da1f02a5" xmlns:ns3="16c05727-aa75-4e4a-9b5f-8a80a1165891" targetNamespace="http://schemas.microsoft.com/office/2006/metadata/properties" ma:root="true" ma:fieldsID="a936d9baba76aa3866493feff160faab" ns2:_="" ns3:_="">
     <xsd:import namespace="71af3243-3dd4-4a8d-8c0d-dd76da1f02a5"/>
@@ -6259,6 +8274,15 @@
 </ct:contentTypeSchema>
 </file>
 
+<file path=customXml/item2.xml><?xml version="1.0" encoding="utf-8"?>
+<?mso-contentType ?>
+<FormTemplates xmlns="http://schemas.microsoft.com/sharepoint/v3/contenttype/forms">
+  <Display>DocumentLibraryForm</Display>
+  <Edit>DocumentLibraryForm</Edit>
+  <New>DocumentLibraryForm</New>
+</FormTemplates>
+</file>
+
 <file path=customXml/item3.xml><?xml version="1.0" encoding="utf-8"?>
 <p:properties xmlns:p="http://schemas.microsoft.com/office/2006/metadata/properties" xmlns:xsi="http://www.w3.org/2001/XMLSchema-instance" xmlns:pc="http://schemas.microsoft.com/office/infopath/2007/PartnerControls">
   <documentManagement>
@@ -6269,14 +8293,6 @@
 </file>
 
 <file path=customXml/itemProps1.xml><?xml version="1.0" encoding="utf-8"?>
-<ds:datastoreItem xmlns:ds="http://schemas.openxmlformats.org/officeDocument/2006/customXml" ds:itemID="{1259D436-C82E-43E0-8A01-53DF9CED6032}">
-  <ds:schemaRefs>
-    <ds:schemaRef ds:uri="http://schemas.microsoft.com/sharepoint/v3/contenttype/forms"/>
-  </ds:schemaRefs>
-</ds:datastoreItem>
-</file>
-
-<file path=customXml/itemProps2.xml><?xml version="1.0" encoding="utf-8"?>
 <ds:datastoreItem xmlns:ds="http://schemas.openxmlformats.org/officeDocument/2006/customXml" ds:itemID="{1F91CDEB-92ED-41DC-BF33-2916A7687628}">
   <ds:schemaRefs>
     <ds:schemaRef ds:uri="http://schemas.microsoft.com/office/2006/metadata/contentType"/>
@@ -6295,6 +8311,14 @@
 </ds:datastoreItem>
 </file>
 
+<file path=customXml/itemProps2.xml><?xml version="1.0" encoding="utf-8"?>
+<ds:datastoreItem xmlns:ds="http://schemas.openxmlformats.org/officeDocument/2006/customXml" ds:itemID="{1259D436-C82E-43E0-8A01-53DF9CED6032}">
+  <ds:schemaRefs>
+    <ds:schemaRef ds:uri="http://schemas.microsoft.com/sharepoint/v3/contenttype/forms"/>
+  </ds:schemaRefs>
+</ds:datastoreItem>
+</file>
+
 <file path=customXml/itemProps3.xml><?xml version="1.0" encoding="utf-8"?>
 <ds:datastoreItem xmlns:ds="http://schemas.openxmlformats.org/officeDocument/2006/customXml" ds:itemID="{946BCBFB-BBC7-42F1-95CD-058E172363A0}">
   <ds:schemaRefs>

</xml_diff>

<commit_message>
dinal first project changes by me
</commit_message>
<xml_diff>
--- a/Lost And found website.pptx
+++ b/Lost And found website.pptx
@@ -5,7 +5,7 @@
     <p:sldMasterId id="2147483660" r:id="rId4"/>
   </p:sldMasterIdLst>
   <p:notesMasterIdLst>
-    <p:notesMasterId r:id="rId12"/>
+    <p:notesMasterId r:id="rId11"/>
   </p:notesMasterIdLst>
   <p:sldIdLst>
     <p:sldId id="264" r:id="rId5"/>
@@ -14,7 +14,6 @@
     <p:sldId id="315" r:id="rId8"/>
     <p:sldId id="316" r:id="rId9"/>
     <p:sldId id="318" r:id="rId10"/>
-    <p:sldId id="317" r:id="rId11"/>
   </p:sldIdLst>
   <p:sldSz cx="12192000" cy="6858000"/>
   <p:notesSz cx="6858000" cy="9144000"/>
@@ -7400,10 +7399,10 @@
       </p:sp>
       <p:pic>
         <p:nvPicPr>
-          <p:cNvPr id="5" name="Content Placeholder 4">
+          <p:cNvPr id="7" name="Content Placeholder 6">
             <a:extLst>
               <a:ext uri="{FF2B5EF4-FFF2-40B4-BE49-F238E27FC236}">
-                <a16:creationId xmlns:a16="http://schemas.microsoft.com/office/drawing/2014/main" id="{0CB9DE68-88DC-EDB6-355C-DA9060B123FB}"/>
+                <a16:creationId xmlns:a16="http://schemas.microsoft.com/office/drawing/2014/main" id="{4CEA414E-6C68-CB24-0A95-B52CB4176B29}"/>
               </a:ext>
             </a:extLst>
           </p:cNvPr>
@@ -7422,8 +7421,8 @@
         </p:blipFill>
         <p:spPr>
           <a:xfrm>
-            <a:off x="1353671" y="2103438"/>
-            <a:ext cx="9699811" cy="4212878"/>
+            <a:off x="1664203" y="2103438"/>
+            <a:ext cx="8863593" cy="3849687"/>
           </a:xfrm>
         </p:spPr>
       </p:pic>
@@ -7431,109 +7430,6 @@
     <p:extLst>
       <p:ext uri="{BB962C8B-B14F-4D97-AF65-F5344CB8AC3E}">
         <p14:creationId xmlns:p14="http://schemas.microsoft.com/office/powerpoint/2010/main" val="819927457"/>
-      </p:ext>
-    </p:extLst>
-  </p:cSld>
-  <p:clrMapOvr>
-    <a:masterClrMapping/>
-  </p:clrMapOvr>
-</p:sld>
-</file>
-
-<file path=ppt/slides/slide7.xml><?xml version="1.0" encoding="utf-8"?>
-<p:sld xmlns:a="http://schemas.openxmlformats.org/drawingml/2006/main" xmlns:r="http://schemas.openxmlformats.org/officeDocument/2006/relationships" xmlns:p="http://schemas.openxmlformats.org/presentationml/2006/main">
-  <p:cSld>
-    <p:spTree>
-      <p:nvGrpSpPr>
-        <p:cNvPr id="1" name=""/>
-        <p:cNvGrpSpPr/>
-        <p:nvPr/>
-      </p:nvGrpSpPr>
-      <p:grpSpPr>
-        <a:xfrm>
-          <a:off x="0" y="0"/>
-          <a:ext cx="0" cy="0"/>
-          <a:chOff x="0" y="0"/>
-          <a:chExt cx="0" cy="0"/>
-        </a:xfrm>
-      </p:grpSpPr>
-      <p:sp>
-        <p:nvSpPr>
-          <p:cNvPr id="2" name="Title 1">
-            <a:extLst>
-              <a:ext uri="{FF2B5EF4-FFF2-40B4-BE49-F238E27FC236}">
-                <a16:creationId xmlns:a16="http://schemas.microsoft.com/office/drawing/2014/main" id="{181B6C67-6420-6592-2BA6-C0791CF45387}"/>
-              </a:ext>
-            </a:extLst>
-          </p:cNvPr>
-          <p:cNvSpPr>
-            <a:spLocks noGrp="1"/>
-          </p:cNvSpPr>
-          <p:nvPr>
-            <p:ph type="title"/>
-          </p:nvPr>
-        </p:nvSpPr>
-        <p:spPr/>
-        <p:txBody>
-          <a:bodyPr/>
-          <a:lstStyle/>
-          <a:p>
-            <a:r>
-              <a:rPr lang="en-US" dirty="0">
-                <a:latin typeface="Algerian" panose="04020705040A02060702" pitchFamily="82" charset="0"/>
-              </a:rPr>
-              <a:t>Database Designing</a:t>
-            </a:r>
-          </a:p>
-        </p:txBody>
-      </p:sp>
-      <p:sp>
-        <p:nvSpPr>
-          <p:cNvPr id="5" name="Text Placeholder 4">
-            <a:extLst>
-              <a:ext uri="{FF2B5EF4-FFF2-40B4-BE49-F238E27FC236}">
-                <a16:creationId xmlns:a16="http://schemas.microsoft.com/office/drawing/2014/main" id="{11C4F4D3-EC3E-8F33-2AE6-8FC25AC84ACA}"/>
-              </a:ext>
-            </a:extLst>
-          </p:cNvPr>
-          <p:cNvSpPr>
-            <a:spLocks noGrp="1"/>
-          </p:cNvSpPr>
-          <p:nvPr>
-            <p:ph type="body" sz="half" idx="2"/>
-          </p:nvPr>
-        </p:nvSpPr>
-        <p:spPr/>
-        <p:txBody>
-          <a:bodyPr/>
-          <a:lstStyle/>
-          <a:p>
-            <a:endParaRPr lang="en-US" dirty="0"/>
-          </a:p>
-        </p:txBody>
-      </p:sp>
-      <p:sp>
-        <p:nvSpPr>
-          <p:cNvPr id="10" name="Picture Placeholder 9">
-            <a:extLst>
-              <a:ext uri="{FF2B5EF4-FFF2-40B4-BE49-F238E27FC236}">
-                <a16:creationId xmlns:a16="http://schemas.microsoft.com/office/drawing/2014/main" id="{4C8B3FA3-7914-FC30-E57B-32A6DC23D88F}"/>
-              </a:ext>
-            </a:extLst>
-          </p:cNvPr>
-          <p:cNvSpPr>
-            <a:spLocks noGrp="1"/>
-          </p:cNvSpPr>
-          <p:nvPr>
-            <p:ph type="pic" idx="1"/>
-          </p:nvPr>
-        </p:nvSpPr>
-        <p:spPr/>
-      </p:sp>
-    </p:spTree>
-    <p:extLst>
-      <p:ext uri="{BB962C8B-B14F-4D97-AF65-F5344CB8AC3E}">
-        <p14:creationId xmlns:p14="http://schemas.microsoft.com/office/powerpoint/2010/main" val="687452228"/>
       </p:ext>
     </p:extLst>
   </p:cSld>
@@ -8158,6 +8054,15 @@
 </file>
 
 <file path=customXml/item1.xml><?xml version="1.0" encoding="utf-8"?>
+<?mso-contentType ?>
+<FormTemplates xmlns="http://schemas.microsoft.com/sharepoint/v3/contenttype/forms">
+  <Display>DocumentLibraryForm</Display>
+  <Edit>DocumentLibraryForm</Edit>
+  <New>DocumentLibraryForm</New>
+</FormTemplates>
+</file>
+
+<file path=customXml/item2.xml><?xml version="1.0" encoding="utf-8"?>
 <ct:contentTypeSchema xmlns:ct="http://schemas.microsoft.com/office/2006/metadata/contentType" xmlns:ma="http://schemas.microsoft.com/office/2006/metadata/properties/metaAttributes" ct:_="" ma:_="" ma:contentTypeName="Document" ma:contentTypeID="0x01010079F111ED35F8CC479449609E8A0923A6" ma:contentTypeVersion="12" ma:contentTypeDescription="Create a new document." ma:contentTypeScope="" ma:versionID="a410dd7f93c95333ffa1b60ed6adedd1">
   <xsd:schema xmlns:xsd="http://www.w3.org/2001/XMLSchema" xmlns:xs="http://www.w3.org/2001/XMLSchema" xmlns:p="http://schemas.microsoft.com/office/2006/metadata/properties" xmlns:ns2="71af3243-3dd4-4a8d-8c0d-dd76da1f02a5" xmlns:ns3="16c05727-aa75-4e4a-9b5f-8a80a1165891" targetNamespace="http://schemas.microsoft.com/office/2006/metadata/properties" ma:root="true" ma:fieldsID="a936d9baba76aa3866493feff160faab" ns2:_="" ns3:_="">
     <xsd:import namespace="71af3243-3dd4-4a8d-8c0d-dd76da1f02a5"/>
@@ -8378,15 +8283,6 @@
 </ct:contentTypeSchema>
 </file>
 
-<file path=customXml/item2.xml><?xml version="1.0" encoding="utf-8"?>
-<?mso-contentType ?>
-<FormTemplates xmlns="http://schemas.microsoft.com/sharepoint/v3/contenttype/forms">
-  <Display>DocumentLibraryForm</Display>
-  <Edit>DocumentLibraryForm</Edit>
-  <New>DocumentLibraryForm</New>
-</FormTemplates>
-</file>
-
 <file path=customXml/item3.xml><?xml version="1.0" encoding="utf-8"?>
 <p:properties xmlns:p="http://schemas.microsoft.com/office/2006/metadata/properties" xmlns:xsi="http://www.w3.org/2001/XMLSchema-instance" xmlns:pc="http://schemas.microsoft.com/office/infopath/2007/PartnerControls">
   <documentManagement>
@@ -8397,6 +8293,14 @@
 </file>
 
 <file path=customXml/itemProps1.xml><?xml version="1.0" encoding="utf-8"?>
+<ds:datastoreItem xmlns:ds="http://schemas.openxmlformats.org/officeDocument/2006/customXml" ds:itemID="{1259D436-C82E-43E0-8A01-53DF9CED6032}">
+  <ds:schemaRefs>
+    <ds:schemaRef ds:uri="http://schemas.microsoft.com/sharepoint/v3/contenttype/forms"/>
+  </ds:schemaRefs>
+</ds:datastoreItem>
+</file>
+
+<file path=customXml/itemProps2.xml><?xml version="1.0" encoding="utf-8"?>
 <ds:datastoreItem xmlns:ds="http://schemas.openxmlformats.org/officeDocument/2006/customXml" ds:itemID="{1F91CDEB-92ED-41DC-BF33-2916A7687628}">
   <ds:schemaRefs>
     <ds:schemaRef ds:uri="http://schemas.microsoft.com/office/2006/metadata/contentType"/>
@@ -8415,14 +8319,6 @@
 </ds:datastoreItem>
 </file>
 
-<file path=customXml/itemProps2.xml><?xml version="1.0" encoding="utf-8"?>
-<ds:datastoreItem xmlns:ds="http://schemas.openxmlformats.org/officeDocument/2006/customXml" ds:itemID="{1259D436-C82E-43E0-8A01-53DF9CED6032}">
-  <ds:schemaRefs>
-    <ds:schemaRef ds:uri="http://schemas.microsoft.com/sharepoint/v3/contenttype/forms"/>
-  </ds:schemaRefs>
-</ds:datastoreItem>
-</file>
-
 <file path=customXml/itemProps3.xml><?xml version="1.0" encoding="utf-8"?>
 <ds:datastoreItem xmlns:ds="http://schemas.openxmlformats.org/officeDocument/2006/customXml" ds:itemID="{946BCBFB-BBC7-42F1-95CD-058E172363A0}">
   <ds:schemaRefs>

</xml_diff>